<commit_message>
:sparkles: onlinekmeans split_cluster func options
</commit_message>
<xml_diff>
--- a/tdk/tdk_v1.pptx
+++ b/tdk/tdk_v1.pptx
@@ -5,7 +5,7 @@
     <p:sldMasterId id="2147483648" r:id="rId1"/>
   </p:sldMasterIdLst>
   <p:notesMasterIdLst>
-    <p:notesMasterId r:id="rId19"/>
+    <p:notesMasterId r:id="rId24"/>
   </p:notesMasterIdLst>
   <p:sldIdLst>
     <p:sldId id="256" r:id="rId2"/>
@@ -17,14 +17,19 @@
     <p:sldId id="262" r:id="rId8"/>
     <p:sldId id="264" r:id="rId9"/>
     <p:sldId id="271" r:id="rId10"/>
-    <p:sldId id="265" r:id="rId11"/>
-    <p:sldId id="266" r:id="rId12"/>
-    <p:sldId id="267" r:id="rId13"/>
-    <p:sldId id="272" r:id="rId14"/>
-    <p:sldId id="270" r:id="rId15"/>
-    <p:sldId id="269" r:id="rId16"/>
-    <p:sldId id="268" r:id="rId17"/>
-    <p:sldId id="260" r:id="rId18"/>
+    <p:sldId id="273" r:id="rId11"/>
+    <p:sldId id="265" r:id="rId12"/>
+    <p:sldId id="274" r:id="rId13"/>
+    <p:sldId id="266" r:id="rId14"/>
+    <p:sldId id="275" r:id="rId15"/>
+    <p:sldId id="267" r:id="rId16"/>
+    <p:sldId id="272" r:id="rId17"/>
+    <p:sldId id="270" r:id="rId18"/>
+    <p:sldId id="276" r:id="rId19"/>
+    <p:sldId id="277" r:id="rId20"/>
+    <p:sldId id="269" r:id="rId21"/>
+    <p:sldId id="268" r:id="rId22"/>
+    <p:sldId id="260" r:id="rId23"/>
   </p:sldIdLst>
   <p:sldSz cx="12192000" cy="6858000"/>
   <p:notesSz cx="6858000" cy="9144000"/>
@@ -213,7 +218,7 @@
           <a:p>
             <a:fld id="{0AB5BC8E-5813-4F4E-B35B-0E3B0D0BF7D5}" type="datetimeFigureOut">
               <a:rPr lang="hu-HU" smtClean="0"/>
-              <a:t>2025. 11. 05.</a:t>
+              <a:t>2025. 11. 06.</a:t>
             </a:fld>
             <a:endParaRPr lang="hu-HU"/>
           </a:p>
@@ -627,7 +632,7 @@
           <a:p>
             <a:fld id="{B7571CAD-6F13-184D-A3E8-750FE35B9EBC}" type="datetime1">
               <a:rPr lang="hu-HU" smtClean="0"/>
-              <a:t>2025. 11. 05.</a:t>
+              <a:t>2025. 11. 06.</a:t>
             </a:fld>
             <a:endParaRPr lang="hu-HU"/>
           </a:p>
@@ -828,7 +833,7 @@
           <a:p>
             <a:fld id="{DA747407-E380-7C4C-956A-D6E19B9BA48E}" type="datetime1">
               <a:rPr lang="hu-HU" smtClean="0"/>
-              <a:t>2025. 11. 05.</a:t>
+              <a:t>2025. 11. 06.</a:t>
             </a:fld>
             <a:endParaRPr lang="hu-HU"/>
           </a:p>
@@ -1036,7 +1041,7 @@
           <a:p>
             <a:fld id="{DE8A1641-DB98-1945-938C-2D56ADE4DCEF}" type="datetime1">
               <a:rPr lang="hu-HU" smtClean="0"/>
-              <a:t>2025. 11. 05.</a:t>
+              <a:t>2025. 11. 06.</a:t>
             </a:fld>
             <a:endParaRPr lang="hu-HU"/>
           </a:p>
@@ -1234,7 +1239,7 @@
           <a:p>
             <a:fld id="{AB697F88-25D7-7E4E-91DA-57125152F457}" type="datetime1">
               <a:rPr lang="hu-HU" smtClean="0"/>
-              <a:t>2025. 11. 05.</a:t>
+              <a:t>2025. 11. 06.</a:t>
             </a:fld>
             <a:endParaRPr lang="hu-HU"/>
           </a:p>
@@ -1509,7 +1514,7 @@
           <a:p>
             <a:fld id="{BB9243F7-EB01-1C49-8DF4-B5E7D3EDCB05}" type="datetime1">
               <a:rPr lang="hu-HU" smtClean="0"/>
-              <a:t>2025. 11. 05.</a:t>
+              <a:t>2025. 11. 06.</a:t>
             </a:fld>
             <a:endParaRPr lang="hu-HU"/>
           </a:p>
@@ -1774,7 +1779,7 @@
           <a:p>
             <a:fld id="{293A0E93-9A86-7044-A356-C546BEFBED63}" type="datetime1">
               <a:rPr lang="hu-HU" smtClean="0"/>
-              <a:t>2025. 11. 05.</a:t>
+              <a:t>2025. 11. 06.</a:t>
             </a:fld>
             <a:endParaRPr lang="hu-HU"/>
           </a:p>
@@ -2186,7 +2191,7 @@
           <a:p>
             <a:fld id="{E4744146-0A6C-8F43-AB21-D823E7CB24D4}" type="datetime1">
               <a:rPr lang="hu-HU" smtClean="0"/>
-              <a:t>2025. 11. 05.</a:t>
+              <a:t>2025. 11. 06.</a:t>
             </a:fld>
             <a:endParaRPr lang="hu-HU"/>
           </a:p>
@@ -2327,7 +2332,7 @@
           <a:p>
             <a:fld id="{8EF3C242-AF4E-0F4E-B1A5-0050A5B92112}" type="datetime1">
               <a:rPr lang="hu-HU" smtClean="0"/>
-              <a:t>2025. 11. 05.</a:t>
+              <a:t>2025. 11. 06.</a:t>
             </a:fld>
             <a:endParaRPr lang="hu-HU"/>
           </a:p>
@@ -2440,7 +2445,7 @@
           <a:p>
             <a:fld id="{B6DD6928-E8BB-F645-9B89-505C65382616}" type="datetime1">
               <a:rPr lang="hu-HU" smtClean="0"/>
-              <a:t>2025. 11. 05.</a:t>
+              <a:t>2025. 11. 06.</a:t>
             </a:fld>
             <a:endParaRPr lang="hu-HU"/>
           </a:p>
@@ -2751,7 +2756,7 @@
           <a:p>
             <a:fld id="{FC32935B-306A-AF4A-83C7-5ACF2C37EC40}" type="datetime1">
               <a:rPr lang="hu-HU" smtClean="0"/>
-              <a:t>2025. 11. 05.</a:t>
+              <a:t>2025. 11. 06.</a:t>
             </a:fld>
             <a:endParaRPr lang="hu-HU"/>
           </a:p>
@@ -3039,7 +3044,7 @@
           <a:p>
             <a:fld id="{DF03F5C2-BC5C-E946-BE19-5970FFE88346}" type="datetime1">
               <a:rPr lang="hu-HU" smtClean="0"/>
-              <a:t>2025. 11. 05.</a:t>
+              <a:t>2025. 11. 06.</a:t>
             </a:fld>
             <a:endParaRPr lang="hu-HU"/>
           </a:p>
@@ -3280,7 +3285,7 @@
           <a:p>
             <a:fld id="{F1EA9AB3-3E45-1F4D-91EA-19B6CDD7EF89}" type="datetime1">
               <a:rPr lang="hu-HU" smtClean="0"/>
-              <a:t>2025. 11. 05.</a:t>
+              <a:t>2025. 11. 06.</a:t>
             </a:fld>
             <a:endParaRPr lang="hu-HU" dirty="0"/>
           </a:p>
@@ -4080,6 +4085,217 @@
           <p:cNvPr id="2" name="Cím 1">
             <a:extLst>
               <a:ext uri="{FF2B5EF4-FFF2-40B4-BE49-F238E27FC236}">
+                <a16:creationId xmlns:a16="http://schemas.microsoft.com/office/drawing/2014/main" id="{D91CC8E9-356E-2A8A-498D-1B17C279FD6B}"/>
+              </a:ext>
+            </a:extLst>
+          </p:cNvPr>
+          <p:cNvSpPr>
+            <a:spLocks noGrp="1"/>
+          </p:cNvSpPr>
+          <p:nvPr>
+            <p:ph type="title"/>
+          </p:nvPr>
+        </p:nvSpPr>
+        <p:spPr/>
+        <p:txBody>
+          <a:bodyPr/>
+          <a:lstStyle/>
+          <a:p>
+            <a:r>
+              <a:rPr lang="hu-HU" b="1" dirty="0" err="1"/>
+              <a:t>Klaszterezési</a:t>
+            </a:r>
+            <a:r>
+              <a:rPr lang="hu-HU" b="1" dirty="0"/>
+              <a:t> algoritmusok futásideje</a:t>
+            </a:r>
+            <a:endParaRPr lang="hu-HU" dirty="0"/>
+          </a:p>
+        </p:txBody>
+      </p:sp>
+      <p:sp>
+        <p:nvSpPr>
+          <p:cNvPr id="3" name="Tartalom helye 2">
+            <a:extLst>
+              <a:ext uri="{FF2B5EF4-FFF2-40B4-BE49-F238E27FC236}">
+                <a16:creationId xmlns:a16="http://schemas.microsoft.com/office/drawing/2014/main" id="{B93B8D71-B18A-E16D-5FBE-EF862C7BB665}"/>
+              </a:ext>
+            </a:extLst>
+          </p:cNvPr>
+          <p:cNvSpPr>
+            <a:spLocks noGrp="1"/>
+          </p:cNvSpPr>
+          <p:nvPr>
+            <p:ph idx="1"/>
+          </p:nvPr>
+        </p:nvSpPr>
+        <p:spPr/>
+        <p:txBody>
+          <a:bodyPr/>
+          <a:lstStyle/>
+          <a:p>
+            <a:r>
+              <a:rPr lang="hu-HU" dirty="0"/>
+              <a:t>Kiértékelés menete:</a:t>
+            </a:r>
+          </a:p>
+          <a:p>
+            <a:pPr lvl="1"/>
+            <a:r>
+              <a:rPr lang="hu-HU" dirty="0"/>
+              <a:t>84.007 </a:t>
+            </a:r>
+            <a:r>
+              <a:rPr lang="hu-HU" dirty="0" err="1"/>
+              <a:t>embedding</a:t>
+            </a:r>
+            <a:r>
+              <a:rPr lang="hu-HU" dirty="0"/>
+              <a:t> (18.891 dokumentumból) vektor </a:t>
+            </a:r>
+            <a:r>
+              <a:rPr lang="hu-HU" dirty="0" err="1"/>
+              <a:t>klaszterezése</a:t>
+            </a:r>
+            <a:r>
+              <a:rPr lang="hu-HU" dirty="0"/>
+              <a:t> változó klaszterszámokra.</a:t>
+            </a:r>
+          </a:p>
+          <a:p>
+            <a:pPr lvl="1"/>
+            <a:r>
+              <a:rPr lang="hu-HU" dirty="0"/>
+              <a:t>Algoritmusok:</a:t>
+            </a:r>
+          </a:p>
+          <a:p>
+            <a:pPr lvl="2"/>
+            <a:r>
+              <a:rPr lang="hu-HU" dirty="0" err="1"/>
+              <a:t>Kmeans</a:t>
+            </a:r>
+            <a:endParaRPr lang="hu-HU" dirty="0"/>
+          </a:p>
+          <a:p>
+            <a:pPr lvl="2"/>
+            <a:r>
+              <a:rPr lang="hu-HU" dirty="0" err="1"/>
+              <a:t>MiniBatchKMeans</a:t>
+            </a:r>
+            <a:endParaRPr lang="hu-HU" dirty="0"/>
+          </a:p>
+          <a:p>
+            <a:pPr lvl="2"/>
+            <a:r>
+              <a:rPr lang="hu-HU" dirty="0" err="1"/>
+              <a:t>OnlineKMeans</a:t>
+            </a:r>
+            <a:endParaRPr lang="hu-HU" dirty="0"/>
+          </a:p>
+          <a:p>
+            <a:pPr lvl="1"/>
+            <a:endParaRPr lang="hu-HU" dirty="0"/>
+          </a:p>
+          <a:p>
+            <a:pPr lvl="1"/>
+            <a:endParaRPr lang="hu-HU" dirty="0"/>
+          </a:p>
+        </p:txBody>
+      </p:sp>
+      <p:sp>
+        <p:nvSpPr>
+          <p:cNvPr id="4" name="Dátum helye 3">
+            <a:extLst>
+              <a:ext uri="{FF2B5EF4-FFF2-40B4-BE49-F238E27FC236}">
+                <a16:creationId xmlns:a16="http://schemas.microsoft.com/office/drawing/2014/main" id="{8877D505-C77A-3697-A926-4FDA6C789F2B}"/>
+              </a:ext>
+            </a:extLst>
+          </p:cNvPr>
+          <p:cNvSpPr>
+            <a:spLocks noGrp="1"/>
+          </p:cNvSpPr>
+          <p:nvPr>
+            <p:ph type="dt" sz="half" idx="10"/>
+          </p:nvPr>
+        </p:nvSpPr>
+        <p:spPr/>
+        <p:txBody>
+          <a:bodyPr/>
+          <a:lstStyle/>
+          <a:p>
+            <a:fld id="{AB697F88-25D7-7E4E-91DA-57125152F457}" type="datetime1">
+              <a:rPr lang="hu-HU" smtClean="0"/>
+              <a:t>2025. 11. 06.</a:t>
+            </a:fld>
+            <a:endParaRPr lang="hu-HU"/>
+          </a:p>
+        </p:txBody>
+      </p:sp>
+      <p:sp>
+        <p:nvSpPr>
+          <p:cNvPr id="5" name="Dia számának helye 4">
+            <a:extLst>
+              <a:ext uri="{FF2B5EF4-FFF2-40B4-BE49-F238E27FC236}">
+                <a16:creationId xmlns:a16="http://schemas.microsoft.com/office/drawing/2014/main" id="{F1F55054-6EE2-F770-6B80-2C7A6299BD94}"/>
+              </a:ext>
+            </a:extLst>
+          </p:cNvPr>
+          <p:cNvSpPr>
+            <a:spLocks noGrp="1"/>
+          </p:cNvSpPr>
+          <p:nvPr>
+            <p:ph type="sldNum" sz="quarter" idx="12"/>
+          </p:nvPr>
+        </p:nvSpPr>
+        <p:spPr/>
+        <p:txBody>
+          <a:bodyPr/>
+          <a:lstStyle/>
+          <a:p>
+            <a:fld id="{61F88ADF-3301-4598-B089-C6A4CC92BE83}" type="slidenum">
+              <a:rPr lang="hu-HU" smtClean="0"/>
+              <a:t>10</a:t>
+            </a:fld>
+            <a:endParaRPr lang="hu-HU"/>
+          </a:p>
+        </p:txBody>
+      </p:sp>
+    </p:spTree>
+    <p:extLst>
+      <p:ext uri="{BB962C8B-B14F-4D97-AF65-F5344CB8AC3E}">
+        <p14:creationId xmlns:p14="http://schemas.microsoft.com/office/powerpoint/2010/main" val="3425339727"/>
+      </p:ext>
+    </p:extLst>
+  </p:cSld>
+  <p:clrMapOvr>
+    <a:masterClrMapping/>
+  </p:clrMapOvr>
+</p:sld>
+</file>
+
+<file path=ppt/slides/slide11.xml><?xml version="1.0" encoding="utf-8"?>
+<p:sld xmlns:a="http://schemas.openxmlformats.org/drawingml/2006/main" xmlns:r="http://schemas.openxmlformats.org/officeDocument/2006/relationships" xmlns:p="http://schemas.openxmlformats.org/presentationml/2006/main">
+  <p:cSld>
+    <p:spTree>
+      <p:nvGrpSpPr>
+        <p:cNvPr id="1" name=""/>
+        <p:cNvGrpSpPr/>
+        <p:nvPr/>
+      </p:nvGrpSpPr>
+      <p:grpSpPr>
+        <a:xfrm>
+          <a:off x="0" y="0"/>
+          <a:ext cx="0" cy="0"/>
+          <a:chOff x="0" y="0"/>
+          <a:chExt cx="0" cy="0"/>
+        </a:xfrm>
+      </p:grpSpPr>
+      <p:sp>
+        <p:nvSpPr>
+          <p:cNvPr id="2" name="Cím 1">
+            <a:extLst>
+              <a:ext uri="{FF2B5EF4-FFF2-40B4-BE49-F238E27FC236}">
                 <a16:creationId xmlns:a16="http://schemas.microsoft.com/office/drawing/2014/main" id="{B525F4D4-ED51-2820-49AF-F3EC1E6A2C4D}"/>
               </a:ext>
             </a:extLst>
@@ -4102,10 +4318,13 @@
           <a:lstStyle/>
           <a:p>
             <a:r>
-              <a:rPr lang="hu-HU" b="1"/>
-              <a:t>Klaszterezési algoritmusok futásideje</a:t>
-            </a:r>
-            <a:endParaRPr lang="hu-HU" b="1" dirty="0"/>
+              <a:rPr lang="hu-HU" b="1" dirty="0" err="1"/>
+              <a:t>Klaszterezési</a:t>
+            </a:r>
+            <a:r>
+              <a:rPr lang="hu-HU" b="1" dirty="0"/>
+              <a:t> algoritmusok futásideje</a:t>
+            </a:r>
           </a:p>
         </p:txBody>
       </p:sp>
@@ -4132,7 +4351,7 @@
           <a:p>
             <a:fld id="{604F7F41-D779-A547-A1A3-0928E654DA43}" type="datetime1">
               <a:rPr lang="hu-HU" smtClean="0"/>
-              <a:t>2025. 11. 05.</a:t>
+              <a:t>2025. 11. 06.</a:t>
             </a:fld>
             <a:endParaRPr lang="hu-HU"/>
           </a:p>
@@ -4161,7 +4380,7 @@
           <a:p>
             <a:fld id="{61F88ADF-3301-4598-B089-C6A4CC92BE83}" type="slidenum">
               <a:rPr lang="hu-HU" smtClean="0"/>
-              <a:t>10</a:t>
+              <a:t>11</a:t>
             </a:fld>
             <a:r>
               <a:rPr lang="hu-HU" dirty="0"/>
@@ -4330,7 +4549,7 @@
 </p:sld>
 </file>
 
-<file path=ppt/slides/slide11.xml><?xml version="1.0" encoding="utf-8"?>
+<file path=ppt/slides/slide12.xml><?xml version="1.0" encoding="utf-8"?>
 <p:sld xmlns:a="http://schemas.openxmlformats.org/drawingml/2006/main" xmlns:r="http://schemas.openxmlformats.org/officeDocument/2006/relationships" xmlns:p="http://schemas.openxmlformats.org/presentationml/2006/main">
   <p:cSld>
     <p:spTree>
@@ -4352,7 +4571,7 @@
           <p:cNvPr id="2" name="Cím 1">
             <a:extLst>
               <a:ext uri="{FF2B5EF4-FFF2-40B4-BE49-F238E27FC236}">
-                <a16:creationId xmlns:a16="http://schemas.microsoft.com/office/drawing/2014/main" id="{55C9B2F7-33BF-5C12-61DB-2CD68A814566}"/>
+                <a16:creationId xmlns:a16="http://schemas.microsoft.com/office/drawing/2014/main" id="{A18C4855-CAF2-5DD9-532A-7A0D88048004}"/>
               </a:ext>
             </a:extLst>
           </p:cNvPr>
@@ -4376,6 +4595,257 @@
               <a:rPr lang="hu-HU" b="1" dirty="0"/>
               <a:t> algoritmusok pontossága</a:t>
             </a:r>
+            <a:endParaRPr lang="hu-HU" dirty="0"/>
+          </a:p>
+        </p:txBody>
+      </p:sp>
+      <p:sp>
+        <p:nvSpPr>
+          <p:cNvPr id="3" name="Tartalom helye 2">
+            <a:extLst>
+              <a:ext uri="{FF2B5EF4-FFF2-40B4-BE49-F238E27FC236}">
+                <a16:creationId xmlns:a16="http://schemas.microsoft.com/office/drawing/2014/main" id="{DB538570-B920-9406-9988-BB1C0443BDB0}"/>
+              </a:ext>
+            </a:extLst>
+          </p:cNvPr>
+          <p:cNvSpPr>
+            <a:spLocks noGrp="1"/>
+          </p:cNvSpPr>
+          <p:nvPr>
+            <p:ph idx="1"/>
+          </p:nvPr>
+        </p:nvSpPr>
+        <p:spPr/>
+        <p:txBody>
+          <a:bodyPr/>
+          <a:lstStyle/>
+          <a:p>
+            <a:r>
+              <a:rPr lang="hu-HU" dirty="0"/>
+              <a:t>Kiértékelés menete:</a:t>
+            </a:r>
+          </a:p>
+          <a:p>
+            <a:pPr lvl="1"/>
+            <a:r>
+              <a:rPr lang="hu-HU" dirty="0"/>
+              <a:t>Szintetikus adathalmaz:</a:t>
+            </a:r>
+          </a:p>
+          <a:p>
+            <a:pPr lvl="2"/>
+            <a:r>
+              <a:rPr lang="hu-HU" dirty="0"/>
+              <a:t>500 dimenziós vektorok</a:t>
+            </a:r>
+          </a:p>
+          <a:p>
+            <a:pPr lvl="2"/>
+            <a:r>
+              <a:rPr lang="hu-HU" dirty="0"/>
+              <a:t>10.000 adatpont</a:t>
+            </a:r>
+          </a:p>
+          <a:p>
+            <a:pPr lvl="2"/>
+            <a:r>
+              <a:rPr lang="hu-HU" dirty="0"/>
+              <a:t>200, 300, 400, 500, 800 klaszter</a:t>
+            </a:r>
+          </a:p>
+          <a:p>
+            <a:pPr lvl="2"/>
+            <a:r>
+              <a:rPr lang="hu-HU" dirty="0"/>
+              <a:t>Minden klaszterszámra </a:t>
+            </a:r>
+            <a:r>
+              <a:rPr lang="el-GR" dirty="0">
+                <a:solidFill>
+                  <a:srgbClr val="000000"/>
+                </a:solidFill>
+                <a:effectLst/>
+                <a:latin typeface="Times New Roman" panose="02020603050405020304" pitchFamily="18" charset="0"/>
+              </a:rPr>
+              <a:t>σ = 2,</a:t>
+            </a:r>
+            <a:r>
+              <a:rPr lang="hu-HU" dirty="0">
+                <a:solidFill>
+                  <a:srgbClr val="000000"/>
+                </a:solidFill>
+                <a:effectLst/>
+                <a:latin typeface="Times New Roman" panose="02020603050405020304" pitchFamily="18" charset="0"/>
+              </a:rPr>
+              <a:t> </a:t>
+            </a:r>
+            <a:r>
+              <a:rPr lang="el-GR" dirty="0">
+                <a:solidFill>
+                  <a:srgbClr val="000000"/>
+                </a:solidFill>
+                <a:effectLst/>
+                <a:latin typeface="Times New Roman" panose="02020603050405020304" pitchFamily="18" charset="0"/>
+              </a:rPr>
+              <a:t>4, 6, 8 </a:t>
+            </a:r>
+            <a:r>
+              <a:rPr lang="hu-HU" dirty="0">
+                <a:solidFill>
+                  <a:srgbClr val="000000"/>
+                </a:solidFill>
+                <a:effectLst/>
+                <a:latin typeface="Times New Roman" panose="02020603050405020304" pitchFamily="18" charset="0"/>
+              </a:rPr>
+              <a:t>és 10 szórással</a:t>
+            </a:r>
+          </a:p>
+          <a:p>
+            <a:pPr lvl="2"/>
+            <a:r>
+              <a:rPr lang="hu-HU" dirty="0">
+                <a:solidFill>
+                  <a:srgbClr val="000000"/>
+                </a:solidFill>
+                <a:latin typeface="Times New Roman" panose="02020603050405020304" pitchFamily="18" charset="0"/>
+              </a:rPr>
+              <a:t>Inicializálás 1.000 adatponton</a:t>
+            </a:r>
+            <a:endParaRPr lang="hu-HU" dirty="0">
+              <a:solidFill>
+                <a:srgbClr val="000000"/>
+              </a:solidFill>
+              <a:effectLst/>
+              <a:latin typeface="Times New Roman" panose="02020603050405020304" pitchFamily="18" charset="0"/>
+            </a:endParaRPr>
+          </a:p>
+          <a:p>
+            <a:pPr lvl="2"/>
+            <a:endParaRPr lang="hu-HU" dirty="0"/>
+          </a:p>
+          <a:p>
+            <a:pPr lvl="2"/>
+            <a:endParaRPr lang="hu-HU" dirty="0"/>
+          </a:p>
+        </p:txBody>
+      </p:sp>
+      <p:sp>
+        <p:nvSpPr>
+          <p:cNvPr id="4" name="Dátum helye 3">
+            <a:extLst>
+              <a:ext uri="{FF2B5EF4-FFF2-40B4-BE49-F238E27FC236}">
+                <a16:creationId xmlns:a16="http://schemas.microsoft.com/office/drawing/2014/main" id="{97B084F8-7887-3ADC-D4D8-A26425144373}"/>
+              </a:ext>
+            </a:extLst>
+          </p:cNvPr>
+          <p:cNvSpPr>
+            <a:spLocks noGrp="1"/>
+          </p:cNvSpPr>
+          <p:nvPr>
+            <p:ph type="dt" sz="half" idx="10"/>
+          </p:nvPr>
+        </p:nvSpPr>
+        <p:spPr/>
+        <p:txBody>
+          <a:bodyPr/>
+          <a:lstStyle/>
+          <a:p>
+            <a:fld id="{AB697F88-25D7-7E4E-91DA-57125152F457}" type="datetime1">
+              <a:rPr lang="hu-HU" smtClean="0"/>
+              <a:t>2025. 11. 06.</a:t>
+            </a:fld>
+            <a:endParaRPr lang="hu-HU"/>
+          </a:p>
+        </p:txBody>
+      </p:sp>
+      <p:sp>
+        <p:nvSpPr>
+          <p:cNvPr id="5" name="Dia számának helye 4">
+            <a:extLst>
+              <a:ext uri="{FF2B5EF4-FFF2-40B4-BE49-F238E27FC236}">
+                <a16:creationId xmlns:a16="http://schemas.microsoft.com/office/drawing/2014/main" id="{C49B74D0-CF8E-A658-AA33-4DF54D917350}"/>
+              </a:ext>
+            </a:extLst>
+          </p:cNvPr>
+          <p:cNvSpPr>
+            <a:spLocks noGrp="1"/>
+          </p:cNvSpPr>
+          <p:nvPr>
+            <p:ph type="sldNum" sz="quarter" idx="12"/>
+          </p:nvPr>
+        </p:nvSpPr>
+        <p:spPr/>
+        <p:txBody>
+          <a:bodyPr/>
+          <a:lstStyle/>
+          <a:p>
+            <a:fld id="{61F88ADF-3301-4598-B089-C6A4CC92BE83}" type="slidenum">
+              <a:rPr lang="hu-HU" smtClean="0"/>
+              <a:t>12</a:t>
+            </a:fld>
+            <a:endParaRPr lang="hu-HU"/>
+          </a:p>
+        </p:txBody>
+      </p:sp>
+    </p:spTree>
+    <p:extLst>
+      <p:ext uri="{BB962C8B-B14F-4D97-AF65-F5344CB8AC3E}">
+        <p14:creationId xmlns:p14="http://schemas.microsoft.com/office/powerpoint/2010/main" val="1625220533"/>
+      </p:ext>
+    </p:extLst>
+  </p:cSld>
+  <p:clrMapOvr>
+    <a:masterClrMapping/>
+  </p:clrMapOvr>
+</p:sld>
+</file>
+
+<file path=ppt/slides/slide13.xml><?xml version="1.0" encoding="utf-8"?>
+<p:sld xmlns:a="http://schemas.openxmlformats.org/drawingml/2006/main" xmlns:r="http://schemas.openxmlformats.org/officeDocument/2006/relationships" xmlns:p="http://schemas.openxmlformats.org/presentationml/2006/main">
+  <p:cSld>
+    <p:spTree>
+      <p:nvGrpSpPr>
+        <p:cNvPr id="1" name=""/>
+        <p:cNvGrpSpPr/>
+        <p:nvPr/>
+      </p:nvGrpSpPr>
+      <p:grpSpPr>
+        <a:xfrm>
+          <a:off x="0" y="0"/>
+          <a:ext cx="0" cy="0"/>
+          <a:chOff x="0" y="0"/>
+          <a:chExt cx="0" cy="0"/>
+        </a:xfrm>
+      </p:grpSpPr>
+      <p:sp>
+        <p:nvSpPr>
+          <p:cNvPr id="2" name="Cím 1">
+            <a:extLst>
+              <a:ext uri="{FF2B5EF4-FFF2-40B4-BE49-F238E27FC236}">
+                <a16:creationId xmlns:a16="http://schemas.microsoft.com/office/drawing/2014/main" id="{55C9B2F7-33BF-5C12-61DB-2CD68A814566}"/>
+              </a:ext>
+            </a:extLst>
+          </p:cNvPr>
+          <p:cNvSpPr>
+            <a:spLocks noGrp="1"/>
+          </p:cNvSpPr>
+          <p:nvPr>
+            <p:ph type="title"/>
+          </p:nvPr>
+        </p:nvSpPr>
+        <p:spPr/>
+        <p:txBody>
+          <a:bodyPr/>
+          <a:lstStyle/>
+          <a:p>
+            <a:r>
+              <a:rPr lang="hu-HU" b="1" dirty="0" err="1"/>
+              <a:t>Klaszterezési</a:t>
+            </a:r>
+            <a:r>
+              <a:rPr lang="hu-HU" b="1" dirty="0"/>
+              <a:t> algoritmusok pontossága</a:t>
+            </a:r>
           </a:p>
         </p:txBody>
       </p:sp>
@@ -4402,7 +4872,7 @@
           <a:p>
             <a:fld id="{1D89F031-1307-194F-983A-F3429BE6CD69}" type="datetime1">
               <a:rPr lang="hu-HU" smtClean="0"/>
-              <a:t>2025. 11. 05.</a:t>
+              <a:t>2025. 11. 06.</a:t>
             </a:fld>
             <a:endParaRPr lang="hu-HU"/>
           </a:p>
@@ -4431,7 +4901,7 @@
           <a:p>
             <a:fld id="{61F88ADF-3301-4598-B089-C6A4CC92BE83}" type="slidenum">
               <a:rPr lang="hu-HU" smtClean="0"/>
-              <a:t>11</a:t>
+              <a:t>13</a:t>
             </a:fld>
             <a:r>
               <a:rPr lang="hu-HU" dirty="0"/>
@@ -4488,7 +4958,7 @@
 </p:sld>
 </file>
 
-<file path=ppt/slides/slide12.xml><?xml version="1.0" encoding="utf-8"?>
+<file path=ppt/slides/slide14.xml><?xml version="1.0" encoding="utf-8"?>
 <p:sld xmlns:a="http://schemas.openxmlformats.org/drawingml/2006/main" xmlns:r="http://schemas.openxmlformats.org/officeDocument/2006/relationships" xmlns:p="http://schemas.openxmlformats.org/presentationml/2006/main">
   <p:cSld>
     <p:spTree>
@@ -4510,7 +4980,7 @@
           <p:cNvPr id="2" name="Cím 1">
             <a:extLst>
               <a:ext uri="{FF2B5EF4-FFF2-40B4-BE49-F238E27FC236}">
-                <a16:creationId xmlns:a16="http://schemas.microsoft.com/office/drawing/2014/main" id="{8D9D9E66-EAAD-305B-FE2A-DC7CD4764041}"/>
+                <a16:creationId xmlns:a16="http://schemas.microsoft.com/office/drawing/2014/main" id="{B16C46A4-6D8D-D412-17FC-B034421735DF}"/>
               </a:ext>
             </a:extLst>
           </p:cNvPr>
@@ -4550,6 +5020,201 @@
               <a:rPr lang="hu-HU" b="1" dirty="0"/>
               <a:t> eredményei</a:t>
             </a:r>
+            <a:endParaRPr lang="hu-HU" dirty="0"/>
+          </a:p>
+        </p:txBody>
+      </p:sp>
+      <p:sp>
+        <p:nvSpPr>
+          <p:cNvPr id="3" name="Tartalom helye 2">
+            <a:extLst>
+              <a:ext uri="{FF2B5EF4-FFF2-40B4-BE49-F238E27FC236}">
+                <a16:creationId xmlns:a16="http://schemas.microsoft.com/office/drawing/2014/main" id="{689235CC-06AC-C5E8-688B-C1936A5D3FD3}"/>
+              </a:ext>
+            </a:extLst>
+          </p:cNvPr>
+          <p:cNvSpPr>
+            <a:spLocks noGrp="1"/>
+          </p:cNvSpPr>
+          <p:nvPr>
+            <p:ph idx="1"/>
+          </p:nvPr>
+        </p:nvSpPr>
+        <p:spPr/>
+        <p:txBody>
+          <a:bodyPr/>
+          <a:lstStyle/>
+          <a:p>
+            <a:r>
+              <a:rPr lang="hu-HU" dirty="0"/>
+              <a:t>Kiértékelés menete:</a:t>
+            </a:r>
+          </a:p>
+          <a:p>
+            <a:pPr lvl="1"/>
+            <a:r>
+              <a:rPr lang="hu-HU" dirty="0"/>
+              <a:t>Cél: Minden </a:t>
+            </a:r>
+            <a:r>
+              <a:rPr lang="hu-HU" dirty="0" err="1"/>
+              <a:t>query-hez</a:t>
+            </a:r>
+            <a:r>
+              <a:rPr lang="hu-HU" dirty="0"/>
+              <a:t> (87.599) megtalálni a legrelevánsabb </a:t>
+            </a:r>
+            <a:r>
+              <a:rPr lang="hu-HU" dirty="0" err="1"/>
+              <a:t>embedding</a:t>
+            </a:r>
+            <a:r>
+              <a:rPr lang="hu-HU" dirty="0"/>
+              <a:t> vektort.</a:t>
+            </a:r>
+          </a:p>
+          <a:p>
+            <a:pPr lvl="1"/>
+            <a:r>
+              <a:rPr lang="hu-HU" dirty="0"/>
+              <a:t>Kérdések 15%-ára nincs válasz.</a:t>
+            </a:r>
+          </a:p>
+        </p:txBody>
+      </p:sp>
+      <p:sp>
+        <p:nvSpPr>
+          <p:cNvPr id="4" name="Dátum helye 3">
+            <a:extLst>
+              <a:ext uri="{FF2B5EF4-FFF2-40B4-BE49-F238E27FC236}">
+                <a16:creationId xmlns:a16="http://schemas.microsoft.com/office/drawing/2014/main" id="{720F0211-477B-15E0-2EBF-2A47A202C6E1}"/>
+              </a:ext>
+            </a:extLst>
+          </p:cNvPr>
+          <p:cNvSpPr>
+            <a:spLocks noGrp="1"/>
+          </p:cNvSpPr>
+          <p:nvPr>
+            <p:ph type="dt" sz="half" idx="10"/>
+          </p:nvPr>
+        </p:nvSpPr>
+        <p:spPr/>
+        <p:txBody>
+          <a:bodyPr/>
+          <a:lstStyle/>
+          <a:p>
+            <a:fld id="{AB697F88-25D7-7E4E-91DA-57125152F457}" type="datetime1">
+              <a:rPr lang="hu-HU" smtClean="0"/>
+              <a:t>2025. 11. 06.</a:t>
+            </a:fld>
+            <a:endParaRPr lang="hu-HU"/>
+          </a:p>
+        </p:txBody>
+      </p:sp>
+      <p:sp>
+        <p:nvSpPr>
+          <p:cNvPr id="5" name="Dia számának helye 4">
+            <a:extLst>
+              <a:ext uri="{FF2B5EF4-FFF2-40B4-BE49-F238E27FC236}">
+                <a16:creationId xmlns:a16="http://schemas.microsoft.com/office/drawing/2014/main" id="{BB189B6E-7E3F-3280-6C58-EF7283E05090}"/>
+              </a:ext>
+            </a:extLst>
+          </p:cNvPr>
+          <p:cNvSpPr>
+            <a:spLocks noGrp="1"/>
+          </p:cNvSpPr>
+          <p:nvPr>
+            <p:ph type="sldNum" sz="quarter" idx="12"/>
+          </p:nvPr>
+        </p:nvSpPr>
+        <p:spPr/>
+        <p:txBody>
+          <a:bodyPr/>
+          <a:lstStyle/>
+          <a:p>
+            <a:fld id="{61F88ADF-3301-4598-B089-C6A4CC92BE83}" type="slidenum">
+              <a:rPr lang="hu-HU" smtClean="0"/>
+              <a:t>14</a:t>
+            </a:fld>
+            <a:endParaRPr lang="hu-HU"/>
+          </a:p>
+        </p:txBody>
+      </p:sp>
+    </p:spTree>
+    <p:extLst>
+      <p:ext uri="{BB962C8B-B14F-4D97-AF65-F5344CB8AC3E}">
+        <p14:creationId xmlns:p14="http://schemas.microsoft.com/office/powerpoint/2010/main" val="2554584894"/>
+      </p:ext>
+    </p:extLst>
+  </p:cSld>
+  <p:clrMapOvr>
+    <a:masterClrMapping/>
+  </p:clrMapOvr>
+</p:sld>
+</file>
+
+<file path=ppt/slides/slide15.xml><?xml version="1.0" encoding="utf-8"?>
+<p:sld xmlns:a="http://schemas.openxmlformats.org/drawingml/2006/main" xmlns:r="http://schemas.openxmlformats.org/officeDocument/2006/relationships" xmlns:p="http://schemas.openxmlformats.org/presentationml/2006/main">
+  <p:cSld>
+    <p:spTree>
+      <p:nvGrpSpPr>
+        <p:cNvPr id="1" name=""/>
+        <p:cNvGrpSpPr/>
+        <p:nvPr/>
+      </p:nvGrpSpPr>
+      <p:grpSpPr>
+        <a:xfrm>
+          <a:off x="0" y="0"/>
+          <a:ext cx="0" cy="0"/>
+          <a:chOff x="0" y="0"/>
+          <a:chExt cx="0" cy="0"/>
+        </a:xfrm>
+      </p:grpSpPr>
+      <p:sp>
+        <p:nvSpPr>
+          <p:cNvPr id="2" name="Cím 1">
+            <a:extLst>
+              <a:ext uri="{FF2B5EF4-FFF2-40B4-BE49-F238E27FC236}">
+                <a16:creationId xmlns:a16="http://schemas.microsoft.com/office/drawing/2014/main" id="{8D9D9E66-EAAD-305B-FE2A-DC7CD4764041}"/>
+              </a:ext>
+            </a:extLst>
+          </p:cNvPr>
+          <p:cNvSpPr>
+            <a:spLocks noGrp="1"/>
+          </p:cNvSpPr>
+          <p:nvPr>
+            <p:ph type="title"/>
+          </p:nvPr>
+        </p:nvSpPr>
+        <p:spPr/>
+        <p:txBody>
+          <a:bodyPr/>
+          <a:lstStyle/>
+          <a:p>
+            <a:r>
+              <a:rPr lang="hu-HU" b="1" dirty="0" err="1"/>
+              <a:t>Klaszterezést</a:t>
+            </a:r>
+            <a:r>
+              <a:rPr lang="hu-HU" b="1" dirty="0"/>
+              <a:t> használó </a:t>
+            </a:r>
+            <a:r>
+              <a:rPr lang="hu-HU" b="1" dirty="0" err="1"/>
+              <a:t>retrieval</a:t>
+            </a:r>
+            <a:r>
+              <a:rPr lang="hu-HU" b="1" dirty="0"/>
+              <a:t> </a:t>
+            </a:r>
+            <a:r>
+              <a:rPr lang="hu-HU" b="1" dirty="0" err="1"/>
+              <a:t>pipeline</a:t>
+            </a:r>
+            <a:r>
+              <a:rPr lang="hu-HU" b="1" dirty="0"/>
+              <a:t> eredményei</a:t>
+            </a:r>
           </a:p>
         </p:txBody>
       </p:sp>
@@ -4576,7 +5241,7 @@
           <a:p>
             <a:fld id="{23789548-D724-1F48-B49D-E29266C4BD81}" type="datetime1">
               <a:rPr lang="hu-HU" smtClean="0"/>
-              <a:t>2025. 11. 05.</a:t>
+              <a:t>2025. 11. 06.</a:t>
             </a:fld>
             <a:endParaRPr lang="hu-HU"/>
           </a:p>
@@ -4605,7 +5270,7 @@
           <a:p>
             <a:fld id="{61F88ADF-3301-4598-B089-C6A4CC92BE83}" type="slidenum">
               <a:rPr lang="hu-HU" smtClean="0"/>
-              <a:t>12</a:t>
+              <a:t>15</a:t>
             </a:fld>
             <a:r>
               <a:rPr lang="hu-HU"/>
@@ -4774,7 +5439,7 @@
 </p:sld>
 </file>
 
-<file path=ppt/slides/slide13.xml><?xml version="1.0" encoding="utf-8"?>
+<file path=ppt/slides/slide16.xml><?xml version="1.0" encoding="utf-8"?>
 <p:sld xmlns:a="http://schemas.openxmlformats.org/drawingml/2006/main" xmlns:r="http://schemas.openxmlformats.org/officeDocument/2006/relationships" xmlns:p="http://schemas.openxmlformats.org/presentationml/2006/main">
   <p:cSld>
     <p:spTree>
@@ -4834,61 +5499,47 @@
             </a:r>
             <a:r>
               <a:rPr lang="hu-HU" b="1" dirty="0"/>
-              <a:t> eredményei</a:t>
+              <a:t> visszakeresési ideje</a:t>
             </a:r>
             <a:endParaRPr lang="hu-HU" dirty="0"/>
           </a:p>
         </p:txBody>
       </p:sp>
-      <p:sp>
-        <p:nvSpPr>
-          <p:cNvPr id="3" name="Tartalom helye 2">
-            <a:extLst>
-              <a:ext uri="{FF2B5EF4-FFF2-40B4-BE49-F238E27FC236}">
-                <a16:creationId xmlns:a16="http://schemas.microsoft.com/office/drawing/2014/main" id="{82CAFC7B-C4DD-DE6F-672D-171841A8A539}"/>
-              </a:ext>
-            </a:extLst>
-          </p:cNvPr>
-          <p:cNvSpPr>
-            <a:spLocks noGrp="1"/>
-          </p:cNvSpPr>
+      <p:pic>
+        <p:nvPicPr>
+          <p:cNvPr id="11" name="Tartalom helye 10">
+            <a:extLst>
+              <a:ext uri="{FF2B5EF4-FFF2-40B4-BE49-F238E27FC236}">
+                <a16:creationId xmlns:a16="http://schemas.microsoft.com/office/drawing/2014/main" id="{46DB39A6-DB0D-DE97-078A-A43CA47E474B}"/>
+              </a:ext>
+            </a:extLst>
+          </p:cNvPr>
+          <p:cNvPicPr>
+            <a:picLocks noGrp="1" noChangeAspect="1"/>
+          </p:cNvPicPr>
           <p:nvPr>
             <p:ph idx="1"/>
           </p:nvPr>
-        </p:nvSpPr>
-        <p:spPr/>
-        <p:txBody>
-          <a:bodyPr/>
-          <a:lstStyle/>
-          <a:p>
-            <a:r>
-              <a:rPr lang="hu-HU" dirty="0"/>
-              <a:t>TODO: </a:t>
-            </a:r>
-            <a:r>
-              <a:rPr lang="hu-HU" dirty="0" err="1"/>
-              <a:t>retrieval</a:t>
-            </a:r>
-            <a:r>
-              <a:rPr lang="hu-HU" dirty="0"/>
-              <a:t> </a:t>
-            </a:r>
-            <a:r>
-              <a:rPr lang="hu-HU" dirty="0" err="1"/>
-              <a:t>times</a:t>
-            </a:r>
-            <a:r>
-              <a:rPr lang="hu-HU" dirty="0"/>
-              <a:t> </a:t>
-            </a:r>
-            <a:r>
-              <a:rPr lang="hu-HU"/>
-              <a:t>picture</a:t>
-            </a:r>
-            <a:endParaRPr lang="hu-HU" dirty="0"/>
-          </a:p>
-        </p:txBody>
-      </p:sp>
+        </p:nvPicPr>
+        <p:blipFill>
+          <a:blip r:embed="rId2">
+            <a:extLst>
+              <a:ext uri="{28A0092B-C50C-407E-A947-70E740481C1C}">
+                <a14:useLocalDpi xmlns:a14="http://schemas.microsoft.com/office/drawing/2010/main" val="0"/>
+              </a:ext>
+            </a:extLst>
+          </a:blip>
+          <a:stretch>
+            <a:fillRect/>
+          </a:stretch>
+        </p:blipFill>
+        <p:spPr>
+          <a:xfrm>
+            <a:off x="413232" y="1584615"/>
+            <a:ext cx="11365536" cy="4683600"/>
+          </a:xfrm>
+        </p:spPr>
+      </p:pic>
       <p:sp>
         <p:nvSpPr>
           <p:cNvPr id="4" name="Dátum helye 3">
@@ -4912,7 +5563,7 @@
           <a:p>
             <a:fld id="{AB697F88-25D7-7E4E-91DA-57125152F457}" type="datetime1">
               <a:rPr lang="hu-HU" smtClean="0"/>
-              <a:t>2025. 11. 05.</a:t>
+              <a:t>2025. 11. 06.</a:t>
             </a:fld>
             <a:endParaRPr lang="hu-HU"/>
           </a:p>
@@ -4941,7 +5592,7 @@
           <a:p>
             <a:fld id="{61F88ADF-3301-4598-B089-C6A4CC92BE83}" type="slidenum">
               <a:rPr lang="hu-HU" smtClean="0"/>
-              <a:t>13</a:t>
+              <a:t>16</a:t>
             </a:fld>
             <a:endParaRPr lang="hu-HU"/>
           </a:p>
@@ -4960,7 +5611,7 @@
 </p:sld>
 </file>
 
-<file path=ppt/slides/slide14.xml><?xml version="1.0" encoding="utf-8"?>
+<file path=ppt/slides/slide17.xml><?xml version="1.0" encoding="utf-8"?>
 <p:sld xmlns:a="http://schemas.openxmlformats.org/drawingml/2006/main" xmlns:r="http://schemas.openxmlformats.org/officeDocument/2006/relationships" xmlns:p="http://schemas.openxmlformats.org/presentationml/2006/main">
   <p:cSld>
     <p:spTree>
@@ -4996,24 +5647,24 @@
         <p:spPr/>
         <p:txBody>
           <a:bodyPr>
-            <a:normAutofit fontScale="90000"/>
+            <a:normAutofit/>
           </a:bodyPr>
           <a:lstStyle/>
           <a:p>
             <a:r>
-              <a:rPr lang="hu-HU" sz="4800" b="1" dirty="0" err="1"/>
+              <a:rPr lang="hu-HU" b="1" dirty="0" err="1"/>
               <a:t>Retrieval</a:t>
             </a:r>
             <a:r>
-              <a:rPr lang="hu-HU" sz="4800" b="1" dirty="0"/>
+              <a:rPr lang="hu-HU" b="1" dirty="0"/>
               <a:t> </a:t>
             </a:r>
             <a:r>
-              <a:rPr lang="hu-HU" sz="4800" b="1" dirty="0" err="1"/>
+              <a:rPr lang="hu-HU" b="1" dirty="0" err="1"/>
               <a:t>pipeline</a:t>
             </a:r>
             <a:r>
-              <a:rPr lang="hu-HU" sz="4800" b="1" dirty="0"/>
+              <a:rPr lang="hu-HU" b="1" dirty="0"/>
               <a:t> változó dokumentum halmazzal</a:t>
             </a:r>
           </a:p>
@@ -5042,7 +5693,7 @@
           <a:p>
             <a:fld id="{AB697F88-25D7-7E4E-91DA-57125152F457}" type="datetime1">
               <a:rPr lang="hu-HU" smtClean="0"/>
-              <a:t>2025. 11. 05.</a:t>
+              <a:t>2025. 11. 06.</a:t>
             </a:fld>
             <a:endParaRPr lang="hu-HU"/>
           </a:p>
@@ -5071,7 +5722,7 @@
           <a:p>
             <a:fld id="{61F88ADF-3301-4598-B089-C6A4CC92BE83}" type="slidenum">
               <a:rPr lang="hu-HU" smtClean="0"/>
-              <a:t>14</a:t>
+              <a:t>17</a:t>
             </a:fld>
             <a:r>
               <a:rPr lang="hu-HU" dirty="0"/>
@@ -5098,10 +5749,106 @@
         </p:nvSpPr>
         <p:spPr/>
         <p:txBody>
-          <a:bodyPr/>
-          <a:lstStyle/>
-          <a:p>
+          <a:bodyPr>
+            <a:normAutofit/>
+          </a:bodyPr>
+          <a:lstStyle/>
+          <a:p>
+            <a:r>
+              <a:rPr lang="hu-HU" dirty="0"/>
+              <a:t>Kiértékelés menete:</a:t>
+            </a:r>
+          </a:p>
+          <a:p>
+            <a:pPr lvl="1"/>
+            <a:r>
+              <a:rPr lang="hu-HU" dirty="0"/>
+              <a:t>84.007 </a:t>
+            </a:r>
+            <a:r>
+              <a:rPr lang="hu-HU" dirty="0" err="1"/>
+              <a:t>embedding</a:t>
+            </a:r>
+            <a:r>
+              <a:rPr lang="hu-HU" dirty="0"/>
+              <a:t> vektor, 87.599 </a:t>
+            </a:r>
+            <a:r>
+              <a:rPr lang="hu-HU" dirty="0" err="1"/>
+              <a:t>query</a:t>
+            </a:r>
+            <a:r>
+              <a:rPr lang="hu-HU" dirty="0"/>
+              <a:t>.</a:t>
+            </a:r>
+          </a:p>
+          <a:p>
+            <a:pPr lvl="1"/>
+            <a:r>
+              <a:rPr lang="hu-HU" dirty="0"/>
+              <a:t>Inicializálás </a:t>
+            </a:r>
+            <a:r>
+              <a:rPr lang="hu-HU" dirty="0" err="1"/>
+              <a:t>embeddingek</a:t>
+            </a:r>
+            <a:r>
+              <a:rPr lang="hu-HU" dirty="0"/>
+              <a:t> 50%-án.</a:t>
+            </a:r>
+          </a:p>
+          <a:p>
+            <a:pPr lvl="1"/>
+            <a:r>
+              <a:rPr lang="hu-HU" dirty="0"/>
+              <a:t>Új adatok 2.000-es batch-</a:t>
+            </a:r>
+            <a:r>
+              <a:rPr lang="hu-HU" dirty="0" err="1"/>
+              <a:t>ekben</a:t>
+            </a:r>
+            <a:r>
+              <a:rPr lang="hu-HU" dirty="0"/>
+              <a:t>.</a:t>
+            </a:r>
+          </a:p>
+          <a:p>
+            <a:pPr lvl="1"/>
+            <a:r>
+              <a:rPr lang="hu-HU" dirty="0"/>
+              <a:t>Vizsgált algoritmusok:</a:t>
+            </a:r>
+          </a:p>
+          <a:p>
+            <a:pPr lvl="2"/>
+            <a:r>
+              <a:rPr lang="hu-HU" dirty="0" err="1"/>
+              <a:t>Kmeans</a:t>
+            </a:r>
             <a:endParaRPr lang="hu-HU" dirty="0"/>
+          </a:p>
+          <a:p>
+            <a:pPr lvl="2"/>
+            <a:r>
+              <a:rPr lang="hu-HU" dirty="0" err="1"/>
+              <a:t>MiniBatchKMeans</a:t>
+            </a:r>
+            <a:endParaRPr lang="hu-HU" dirty="0"/>
+          </a:p>
+          <a:p>
+            <a:pPr lvl="2"/>
+            <a:r>
+              <a:rPr lang="hu-HU" dirty="0" err="1"/>
+              <a:t>OnlineKMeans</a:t>
+            </a:r>
+            <a:endParaRPr lang="hu-HU" dirty="0"/>
+          </a:p>
+          <a:p>
+            <a:pPr lvl="2"/>
+            <a:r>
+              <a:rPr lang="hu-HU" dirty="0"/>
+              <a:t>FAISS (HNSW)</a:t>
+            </a:r>
           </a:p>
         </p:txBody>
       </p:sp>
@@ -5118,7 +5865,1139 @@
 </p:sld>
 </file>
 
-<file path=ppt/slides/slide15.xml><?xml version="1.0" encoding="utf-8"?>
+<file path=ppt/slides/slide18.xml><?xml version="1.0" encoding="utf-8"?>
+<p:sld xmlns:a="http://schemas.openxmlformats.org/drawingml/2006/main" xmlns:r="http://schemas.openxmlformats.org/officeDocument/2006/relationships" xmlns:p="http://schemas.openxmlformats.org/presentationml/2006/main">
+  <p:cSld>
+    <p:spTree>
+      <p:nvGrpSpPr>
+        <p:cNvPr id="1" name=""/>
+        <p:cNvGrpSpPr/>
+        <p:nvPr/>
+      </p:nvGrpSpPr>
+      <p:grpSpPr>
+        <a:xfrm>
+          <a:off x="0" y="0"/>
+          <a:ext cx="0" cy="0"/>
+          <a:chOff x="0" y="0"/>
+          <a:chExt cx="0" cy="0"/>
+        </a:xfrm>
+      </p:grpSpPr>
+      <p:sp>
+        <p:nvSpPr>
+          <p:cNvPr id="2" name="Cím 1">
+            <a:extLst>
+              <a:ext uri="{FF2B5EF4-FFF2-40B4-BE49-F238E27FC236}">
+                <a16:creationId xmlns:a16="http://schemas.microsoft.com/office/drawing/2014/main" id="{13BED8F0-B3A5-60F7-E321-B144BD435B16}"/>
+              </a:ext>
+            </a:extLst>
+          </p:cNvPr>
+          <p:cNvSpPr>
+            <a:spLocks noGrp="1"/>
+          </p:cNvSpPr>
+          <p:nvPr>
+            <p:ph type="title"/>
+          </p:nvPr>
+        </p:nvSpPr>
+        <p:spPr/>
+        <p:txBody>
+          <a:bodyPr>
+            <a:normAutofit/>
+          </a:bodyPr>
+          <a:lstStyle/>
+          <a:p>
+            <a:r>
+              <a:rPr lang="hu-HU" b="1" dirty="0" err="1"/>
+              <a:t>Retrieval</a:t>
+            </a:r>
+            <a:r>
+              <a:rPr lang="hu-HU" b="1" dirty="0"/>
+              <a:t> </a:t>
+            </a:r>
+            <a:r>
+              <a:rPr lang="hu-HU" b="1" dirty="0" err="1"/>
+              <a:t>pipeline</a:t>
+            </a:r>
+            <a:r>
+              <a:rPr lang="hu-HU" b="1" dirty="0"/>
+              <a:t> változó dokumentum halmazzal</a:t>
+            </a:r>
+            <a:endParaRPr lang="hu-HU" dirty="0"/>
+          </a:p>
+        </p:txBody>
+      </p:sp>
+      <p:pic>
+        <p:nvPicPr>
+          <p:cNvPr id="7" name="Tartalom helye 6">
+            <a:extLst>
+              <a:ext uri="{FF2B5EF4-FFF2-40B4-BE49-F238E27FC236}">
+                <a16:creationId xmlns:a16="http://schemas.microsoft.com/office/drawing/2014/main" id="{2814D4FF-37CA-07CC-4917-A39068E708F4}"/>
+              </a:ext>
+            </a:extLst>
+          </p:cNvPr>
+          <p:cNvPicPr>
+            <a:picLocks noGrp="1" noChangeAspect="1"/>
+          </p:cNvPicPr>
+          <p:nvPr>
+            <p:ph idx="1"/>
+          </p:nvPr>
+        </p:nvPicPr>
+        <p:blipFill>
+          <a:blip r:embed="rId2">
+            <a:extLst>
+              <a:ext uri="{28A0092B-C50C-407E-A947-70E740481C1C}">
+                <a14:useLocalDpi xmlns:a14="http://schemas.microsoft.com/office/drawing/2010/main" val="0"/>
+              </a:ext>
+            </a:extLst>
+          </a:blip>
+          <a:stretch>
+            <a:fillRect/>
+          </a:stretch>
+        </p:blipFill>
+        <p:spPr>
+          <a:xfrm>
+            <a:off x="838200" y="1576512"/>
+            <a:ext cx="10303920" cy="4683600"/>
+          </a:xfrm>
+        </p:spPr>
+      </p:pic>
+      <p:sp>
+        <p:nvSpPr>
+          <p:cNvPr id="4" name="Dátum helye 3">
+            <a:extLst>
+              <a:ext uri="{FF2B5EF4-FFF2-40B4-BE49-F238E27FC236}">
+                <a16:creationId xmlns:a16="http://schemas.microsoft.com/office/drawing/2014/main" id="{75C52C96-71A3-7B11-9A08-97D6BE641363}"/>
+              </a:ext>
+            </a:extLst>
+          </p:cNvPr>
+          <p:cNvSpPr>
+            <a:spLocks noGrp="1"/>
+          </p:cNvSpPr>
+          <p:nvPr>
+            <p:ph type="dt" sz="half" idx="10"/>
+          </p:nvPr>
+        </p:nvSpPr>
+        <p:spPr/>
+        <p:txBody>
+          <a:bodyPr/>
+          <a:lstStyle/>
+          <a:p>
+            <a:fld id="{AB697F88-25D7-7E4E-91DA-57125152F457}" type="datetime1">
+              <a:rPr lang="hu-HU" smtClean="0"/>
+              <a:t>2025. 11. 06.</a:t>
+            </a:fld>
+            <a:endParaRPr lang="hu-HU"/>
+          </a:p>
+        </p:txBody>
+      </p:sp>
+      <p:sp>
+        <p:nvSpPr>
+          <p:cNvPr id="5" name="Dia számának helye 4">
+            <a:extLst>
+              <a:ext uri="{FF2B5EF4-FFF2-40B4-BE49-F238E27FC236}">
+                <a16:creationId xmlns:a16="http://schemas.microsoft.com/office/drawing/2014/main" id="{90EFBDA3-F08B-8523-65E6-5283DDC38FB7}"/>
+              </a:ext>
+            </a:extLst>
+          </p:cNvPr>
+          <p:cNvSpPr>
+            <a:spLocks noGrp="1"/>
+          </p:cNvSpPr>
+          <p:nvPr>
+            <p:ph type="sldNum" sz="quarter" idx="12"/>
+          </p:nvPr>
+        </p:nvSpPr>
+        <p:spPr/>
+        <p:txBody>
+          <a:bodyPr/>
+          <a:lstStyle/>
+          <a:p>
+            <a:fld id="{61F88ADF-3301-4598-B089-C6A4CC92BE83}" type="slidenum">
+              <a:rPr lang="hu-HU" smtClean="0"/>
+              <a:t>18</a:t>
+            </a:fld>
+            <a:endParaRPr lang="hu-HU"/>
+          </a:p>
+        </p:txBody>
+      </p:sp>
+      <p:pic>
+        <p:nvPicPr>
+          <p:cNvPr id="9" name="Kép 8">
+            <a:extLst>
+              <a:ext uri="{FF2B5EF4-FFF2-40B4-BE49-F238E27FC236}">
+                <a16:creationId xmlns:a16="http://schemas.microsoft.com/office/drawing/2014/main" id="{2296B4B3-EF9B-7160-D129-A1B840E03F50}"/>
+              </a:ext>
+            </a:extLst>
+          </p:cNvPr>
+          <p:cNvPicPr>
+            <a:picLocks noChangeAspect="1"/>
+          </p:cNvPicPr>
+          <p:nvPr/>
+        </p:nvPicPr>
+        <p:blipFill>
+          <a:blip r:embed="rId3">
+            <a:extLst>
+              <a:ext uri="{28A0092B-C50C-407E-A947-70E740481C1C}">
+                <a14:useLocalDpi xmlns:a14="http://schemas.microsoft.com/office/drawing/2010/main" val="0"/>
+              </a:ext>
+            </a:extLst>
+          </a:blip>
+          <a:stretch>
+            <a:fillRect/>
+          </a:stretch>
+        </p:blipFill>
+        <p:spPr>
+          <a:xfrm>
+            <a:off x="838200" y="1576512"/>
+            <a:ext cx="10303920" cy="4683600"/>
+          </a:xfrm>
+          <a:prstGeom prst="rect">
+            <a:avLst/>
+          </a:prstGeom>
+        </p:spPr>
+      </p:pic>
+    </p:spTree>
+    <p:extLst>
+      <p:ext uri="{BB962C8B-B14F-4D97-AF65-F5344CB8AC3E}">
+        <p14:creationId xmlns:p14="http://schemas.microsoft.com/office/powerpoint/2010/main" val="3507657180"/>
+      </p:ext>
+    </p:extLst>
+  </p:cSld>
+  <p:clrMapOvr>
+    <a:masterClrMapping/>
+  </p:clrMapOvr>
+  <p:timing>
+    <p:tnLst>
+      <p:par>
+        <p:cTn id="1" dur="indefinite" restart="never" nodeType="tmRoot">
+          <p:childTnLst>
+            <p:seq concurrent="1" nextAc="seek">
+              <p:cTn id="2" dur="indefinite" nodeType="mainSeq">
+                <p:childTnLst>
+                  <p:par>
+                    <p:cTn id="3" fill="hold">
+                      <p:stCondLst>
+                        <p:cond delay="indefinite"/>
+                      </p:stCondLst>
+                      <p:childTnLst>
+                        <p:par>
+                          <p:cTn id="4" fill="hold">
+                            <p:stCondLst>
+                              <p:cond delay="0"/>
+                            </p:stCondLst>
+                            <p:childTnLst>
+                              <p:par>
+                                <p:cTn id="5" presetID="1" presetClass="entr" presetSubtype="0" fill="hold" nodeType="clickEffect">
+                                  <p:stCondLst>
+                                    <p:cond delay="0"/>
+                                  </p:stCondLst>
+                                  <p:childTnLst>
+                                    <p:set>
+                                      <p:cBhvr>
+                                        <p:cTn id="6" dur="1" fill="hold">
+                                          <p:stCondLst>
+                                            <p:cond delay="0"/>
+                                          </p:stCondLst>
+                                        </p:cTn>
+                                        <p:tgtEl>
+                                          <p:spTgt spid="9"/>
+                                        </p:tgtEl>
+                                        <p:attrNameLst>
+                                          <p:attrName>style.visibility</p:attrName>
+                                        </p:attrNameLst>
+                                      </p:cBhvr>
+                                      <p:to>
+                                        <p:strVal val="visible"/>
+                                      </p:to>
+                                    </p:set>
+                                  </p:childTnLst>
+                                </p:cTn>
+                              </p:par>
+                            </p:childTnLst>
+                          </p:cTn>
+                        </p:par>
+                      </p:childTnLst>
+                    </p:cTn>
+                  </p:par>
+                </p:childTnLst>
+              </p:cTn>
+              <p:prevCondLst>
+                <p:cond evt="onPrev" delay="0">
+                  <p:tgtEl>
+                    <p:sldTgt/>
+                  </p:tgtEl>
+                </p:cond>
+              </p:prevCondLst>
+              <p:nextCondLst>
+                <p:cond evt="onNext" delay="0">
+                  <p:tgtEl>
+                    <p:sldTgt/>
+                  </p:tgtEl>
+                </p:cond>
+              </p:nextCondLst>
+            </p:seq>
+          </p:childTnLst>
+        </p:cTn>
+      </p:par>
+    </p:tnLst>
+  </p:timing>
+</p:sld>
+</file>
+
+<file path=ppt/slides/slide19.xml><?xml version="1.0" encoding="utf-8"?>
+<p:sld xmlns:a="http://schemas.openxmlformats.org/drawingml/2006/main" xmlns:r="http://schemas.openxmlformats.org/officeDocument/2006/relationships" xmlns:p="http://schemas.openxmlformats.org/presentationml/2006/main">
+  <p:cSld>
+    <p:spTree>
+      <p:nvGrpSpPr>
+        <p:cNvPr id="1" name=""/>
+        <p:cNvGrpSpPr/>
+        <p:nvPr/>
+      </p:nvGrpSpPr>
+      <p:grpSpPr>
+        <a:xfrm>
+          <a:off x="0" y="0"/>
+          <a:ext cx="0" cy="0"/>
+          <a:chOff x="0" y="0"/>
+          <a:chExt cx="0" cy="0"/>
+        </a:xfrm>
+      </p:grpSpPr>
+      <p:sp>
+        <p:nvSpPr>
+          <p:cNvPr id="2" name="Cím 1">
+            <a:extLst>
+              <a:ext uri="{FF2B5EF4-FFF2-40B4-BE49-F238E27FC236}">
+                <a16:creationId xmlns:a16="http://schemas.microsoft.com/office/drawing/2014/main" id="{C22C004D-1D65-EB37-2448-8EE4997B489E}"/>
+              </a:ext>
+            </a:extLst>
+          </p:cNvPr>
+          <p:cNvSpPr>
+            <a:spLocks noGrp="1"/>
+          </p:cNvSpPr>
+          <p:nvPr>
+            <p:ph type="title"/>
+          </p:nvPr>
+        </p:nvSpPr>
+        <p:spPr/>
+        <p:txBody>
+          <a:bodyPr/>
+          <a:lstStyle/>
+          <a:p>
+            <a:r>
+              <a:rPr lang="hu-HU" b="1" dirty="0" err="1"/>
+              <a:t>Retrieval</a:t>
+            </a:r>
+            <a:r>
+              <a:rPr lang="hu-HU" b="1" dirty="0"/>
+              <a:t> </a:t>
+            </a:r>
+            <a:r>
+              <a:rPr lang="hu-HU" b="1" dirty="0" err="1"/>
+              <a:t>pipeline</a:t>
+            </a:r>
+            <a:r>
+              <a:rPr lang="hu-HU" b="1" dirty="0"/>
+              <a:t> változó dokumentum halmazzal</a:t>
+            </a:r>
+            <a:endParaRPr lang="hu-HU" dirty="0"/>
+          </a:p>
+        </p:txBody>
+      </p:sp>
+      <p:pic>
+        <p:nvPicPr>
+          <p:cNvPr id="7" name="Tartalom helye 6" descr="A képen szöveg, képernyőkép, sor, Diagram látható&#10;&#10;Automatikusan generált leírás">
+            <a:extLst>
+              <a:ext uri="{FF2B5EF4-FFF2-40B4-BE49-F238E27FC236}">
+                <a16:creationId xmlns:a16="http://schemas.microsoft.com/office/drawing/2014/main" id="{09BA973A-3273-5842-7415-0A51D97B199C}"/>
+              </a:ext>
+            </a:extLst>
+          </p:cNvPr>
+          <p:cNvPicPr>
+            <a:picLocks noGrp="1" noChangeAspect="1"/>
+          </p:cNvPicPr>
+          <p:nvPr>
+            <p:ph idx="1"/>
+          </p:nvPr>
+        </p:nvPicPr>
+        <p:blipFill>
+          <a:blip r:embed="rId2">
+            <a:extLst>
+              <a:ext uri="{28A0092B-C50C-407E-A947-70E740481C1C}">
+                <a14:useLocalDpi xmlns:a14="http://schemas.microsoft.com/office/drawing/2010/main" val="0"/>
+              </a:ext>
+            </a:extLst>
+          </a:blip>
+          <a:stretch>
+            <a:fillRect/>
+          </a:stretch>
+        </p:blipFill>
+        <p:spPr>
+          <a:xfrm>
+            <a:off x="1772258" y="1552193"/>
+            <a:ext cx="8647483" cy="4804157"/>
+          </a:xfrm>
+        </p:spPr>
+      </p:pic>
+      <p:sp>
+        <p:nvSpPr>
+          <p:cNvPr id="4" name="Dátum helye 3">
+            <a:extLst>
+              <a:ext uri="{FF2B5EF4-FFF2-40B4-BE49-F238E27FC236}">
+                <a16:creationId xmlns:a16="http://schemas.microsoft.com/office/drawing/2014/main" id="{118FBCE9-D862-C9E2-701F-A747EB892D45}"/>
+              </a:ext>
+            </a:extLst>
+          </p:cNvPr>
+          <p:cNvSpPr>
+            <a:spLocks noGrp="1"/>
+          </p:cNvSpPr>
+          <p:nvPr>
+            <p:ph type="dt" sz="half" idx="10"/>
+          </p:nvPr>
+        </p:nvSpPr>
+        <p:spPr/>
+        <p:txBody>
+          <a:bodyPr/>
+          <a:lstStyle/>
+          <a:p>
+            <a:fld id="{AB697F88-25D7-7E4E-91DA-57125152F457}" type="datetime1">
+              <a:rPr lang="hu-HU" smtClean="0"/>
+              <a:t>2025. 11. 06.</a:t>
+            </a:fld>
+            <a:endParaRPr lang="hu-HU"/>
+          </a:p>
+        </p:txBody>
+      </p:sp>
+      <p:sp>
+        <p:nvSpPr>
+          <p:cNvPr id="5" name="Dia számának helye 4">
+            <a:extLst>
+              <a:ext uri="{FF2B5EF4-FFF2-40B4-BE49-F238E27FC236}">
+                <a16:creationId xmlns:a16="http://schemas.microsoft.com/office/drawing/2014/main" id="{63732086-E6AD-86B0-13EA-3E994DC61017}"/>
+              </a:ext>
+            </a:extLst>
+          </p:cNvPr>
+          <p:cNvSpPr>
+            <a:spLocks noGrp="1"/>
+          </p:cNvSpPr>
+          <p:nvPr>
+            <p:ph type="sldNum" sz="quarter" idx="12"/>
+          </p:nvPr>
+        </p:nvSpPr>
+        <p:spPr/>
+        <p:txBody>
+          <a:bodyPr/>
+          <a:lstStyle/>
+          <a:p>
+            <a:fld id="{61F88ADF-3301-4598-B089-C6A4CC92BE83}" type="slidenum">
+              <a:rPr lang="hu-HU" smtClean="0"/>
+              <a:t>19</a:t>
+            </a:fld>
+            <a:endParaRPr lang="hu-HU"/>
+          </a:p>
+        </p:txBody>
+      </p:sp>
+      <p:pic>
+        <p:nvPicPr>
+          <p:cNvPr id="9" name="Kép 8" descr="A képen szöveg, sor, Diagram, diagram látható&#10;&#10;Automatikusan generált leírás">
+            <a:extLst>
+              <a:ext uri="{FF2B5EF4-FFF2-40B4-BE49-F238E27FC236}">
+                <a16:creationId xmlns:a16="http://schemas.microsoft.com/office/drawing/2014/main" id="{D65EAF16-EDB2-9027-5E8C-1AF7E77075EE}"/>
+              </a:ext>
+            </a:extLst>
+          </p:cNvPr>
+          <p:cNvPicPr>
+            <a:picLocks noChangeAspect="1"/>
+          </p:cNvPicPr>
+          <p:nvPr/>
+        </p:nvPicPr>
+        <p:blipFill>
+          <a:blip r:embed="rId3">
+            <a:extLst>
+              <a:ext uri="{28A0092B-C50C-407E-A947-70E740481C1C}">
+                <a14:useLocalDpi xmlns:a14="http://schemas.microsoft.com/office/drawing/2010/main" val="0"/>
+              </a:ext>
+            </a:extLst>
+          </a:blip>
+          <a:stretch>
+            <a:fillRect/>
+          </a:stretch>
+        </p:blipFill>
+        <p:spPr>
+          <a:xfrm>
+            <a:off x="1768941" y="1557316"/>
+            <a:ext cx="8650800" cy="4806000"/>
+          </a:xfrm>
+          <a:prstGeom prst="rect">
+            <a:avLst/>
+          </a:prstGeom>
+        </p:spPr>
+      </p:pic>
+    </p:spTree>
+    <p:extLst>
+      <p:ext uri="{BB962C8B-B14F-4D97-AF65-F5344CB8AC3E}">
+        <p14:creationId xmlns:p14="http://schemas.microsoft.com/office/powerpoint/2010/main" val="2934091421"/>
+      </p:ext>
+    </p:extLst>
+  </p:cSld>
+  <p:clrMapOvr>
+    <a:masterClrMapping/>
+  </p:clrMapOvr>
+  <p:timing>
+    <p:tnLst>
+      <p:par>
+        <p:cTn id="1" dur="indefinite" restart="never" nodeType="tmRoot">
+          <p:childTnLst>
+            <p:seq concurrent="1" nextAc="seek">
+              <p:cTn id="2" dur="indefinite" nodeType="mainSeq">
+                <p:childTnLst>
+                  <p:par>
+                    <p:cTn id="3" fill="hold">
+                      <p:stCondLst>
+                        <p:cond delay="indefinite"/>
+                      </p:stCondLst>
+                      <p:childTnLst>
+                        <p:par>
+                          <p:cTn id="4" fill="hold">
+                            <p:stCondLst>
+                              <p:cond delay="0"/>
+                            </p:stCondLst>
+                            <p:childTnLst>
+                              <p:par>
+                                <p:cTn id="5" presetID="1" presetClass="entr" presetSubtype="0" fill="hold" nodeType="clickEffect">
+                                  <p:stCondLst>
+                                    <p:cond delay="0"/>
+                                  </p:stCondLst>
+                                  <p:childTnLst>
+                                    <p:set>
+                                      <p:cBhvr>
+                                        <p:cTn id="6" dur="1" fill="hold">
+                                          <p:stCondLst>
+                                            <p:cond delay="0"/>
+                                          </p:stCondLst>
+                                        </p:cTn>
+                                        <p:tgtEl>
+                                          <p:spTgt spid="9"/>
+                                        </p:tgtEl>
+                                        <p:attrNameLst>
+                                          <p:attrName>style.visibility</p:attrName>
+                                        </p:attrNameLst>
+                                      </p:cBhvr>
+                                      <p:to>
+                                        <p:strVal val="visible"/>
+                                      </p:to>
+                                    </p:set>
+                                  </p:childTnLst>
+                                </p:cTn>
+                              </p:par>
+                            </p:childTnLst>
+                          </p:cTn>
+                        </p:par>
+                      </p:childTnLst>
+                    </p:cTn>
+                  </p:par>
+                </p:childTnLst>
+              </p:cTn>
+              <p:prevCondLst>
+                <p:cond evt="onPrev" delay="0">
+                  <p:tgtEl>
+                    <p:sldTgt/>
+                  </p:tgtEl>
+                </p:cond>
+              </p:prevCondLst>
+              <p:nextCondLst>
+                <p:cond evt="onNext" delay="0">
+                  <p:tgtEl>
+                    <p:sldTgt/>
+                  </p:tgtEl>
+                </p:cond>
+              </p:nextCondLst>
+            </p:seq>
+          </p:childTnLst>
+        </p:cTn>
+      </p:par>
+    </p:tnLst>
+  </p:timing>
+</p:sld>
+</file>
+
+<file path=ppt/slides/slide2.xml><?xml version="1.0" encoding="utf-8"?>
+<p:sld xmlns:a="http://schemas.openxmlformats.org/drawingml/2006/main" xmlns:r="http://schemas.openxmlformats.org/officeDocument/2006/relationships" xmlns:p="http://schemas.openxmlformats.org/presentationml/2006/main">
+  <p:cSld>
+    <p:bg>
+      <p:bgPr>
+        <a:solidFill>
+          <a:schemeClr val="bg1"/>
+        </a:solidFill>
+        <a:effectLst/>
+      </p:bgPr>
+    </p:bg>
+    <p:spTree>
+      <p:nvGrpSpPr>
+        <p:cNvPr id="1" name=""/>
+        <p:cNvGrpSpPr/>
+        <p:nvPr/>
+      </p:nvGrpSpPr>
+      <p:grpSpPr>
+        <a:xfrm>
+          <a:off x="0" y="0"/>
+          <a:ext cx="0" cy="0"/>
+          <a:chOff x="0" y="0"/>
+          <a:chExt cx="0" cy="0"/>
+        </a:xfrm>
+      </p:grpSpPr>
+      <p:sp useBgFill="1">
+        <p:nvSpPr>
+          <p:cNvPr id="10" name="Rectangle 9">
+            <a:extLst>
+              <a:ext uri="{FF2B5EF4-FFF2-40B4-BE49-F238E27FC236}">
+                <a16:creationId xmlns:a16="http://schemas.microsoft.com/office/drawing/2014/main" id="{BCED4D40-4B67-4331-AC48-79B82B4A47D8}"/>
+              </a:ext>
+              <a:ext uri="{C183D7F6-B498-43B3-948B-1728B52AA6E4}">
+                <adec:decorative xmlns:adec="http://schemas.microsoft.com/office/drawing/2017/decorative" val="1"/>
+              </a:ext>
+            </a:extLst>
+          </p:cNvPr>
+          <p:cNvSpPr>
+            <a:spLocks noGrp="1" noRot="1" noChangeAspect="1" noMove="1" noResize="1" noEditPoints="1" noAdjustHandles="1" noChangeArrowheads="1" noChangeShapeType="1" noTextEdit="1"/>
+          </p:cNvSpPr>
+          <p:nvPr>
+            <p:extLst>
+              <p:ext uri="{386F3935-93C4-4BCD-93E2-E3B085C9AB24}">
+                <p16:designElem xmlns:p16="http://schemas.microsoft.com/office/powerpoint/2015/main" val="1"/>
+              </p:ext>
+            </p:extLst>
+          </p:nvPr>
+        </p:nvSpPr>
+        <p:spPr>
+          <a:xfrm>
+            <a:off x="0" y="0"/>
+            <a:ext cx="12192000" cy="6858000"/>
+          </a:xfrm>
+          <a:prstGeom prst="rect">
+            <a:avLst/>
+          </a:prstGeom>
+          <a:ln>
+            <a:noFill/>
+          </a:ln>
+        </p:spPr>
+        <p:style>
+          <a:lnRef idx="2">
+            <a:schemeClr val="accent1">
+              <a:shade val="50000"/>
+            </a:schemeClr>
+          </a:lnRef>
+          <a:fillRef idx="1">
+            <a:schemeClr val="accent1"/>
+          </a:fillRef>
+          <a:effectRef idx="0">
+            <a:schemeClr val="accent1"/>
+          </a:effectRef>
+          <a:fontRef idx="minor">
+            <a:schemeClr val="lt1"/>
+          </a:fontRef>
+        </p:style>
+        <p:txBody>
+          <a:bodyPr rtlCol="0" anchor="ctr"/>
+          <a:lstStyle/>
+          <a:p>
+            <a:pPr algn="ctr"/>
+            <a:endParaRPr lang="en-US"/>
+          </a:p>
+        </p:txBody>
+      </p:sp>
+      <p:sp>
+        <p:nvSpPr>
+          <p:cNvPr id="2" name="Cím 1">
+            <a:extLst>
+              <a:ext uri="{FF2B5EF4-FFF2-40B4-BE49-F238E27FC236}">
+                <a16:creationId xmlns:a16="http://schemas.microsoft.com/office/drawing/2014/main" id="{776A5C5B-9E91-0643-44A3-847AC216A035}"/>
+              </a:ext>
+            </a:extLst>
+          </p:cNvPr>
+          <p:cNvSpPr>
+            <a:spLocks noGrp="1"/>
+          </p:cNvSpPr>
+          <p:nvPr>
+            <p:ph type="title"/>
+          </p:nvPr>
+        </p:nvSpPr>
+        <p:spPr>
+          <a:xfrm>
+            <a:off x="638881" y="417576"/>
+            <a:ext cx="10909640" cy="1249394"/>
+          </a:xfrm>
+        </p:spPr>
+        <p:txBody>
+          <a:bodyPr vert="horz" lIns="91440" tIns="45720" rIns="91440" bIns="45720" rtlCol="0" anchor="ctr">
+            <a:normAutofit/>
+          </a:bodyPr>
+          <a:lstStyle/>
+          <a:p>
+            <a:pPr algn="ctr"/>
+            <a:r>
+              <a:rPr lang="en-US" sz="6100" b="1" kern="1200" dirty="0">
+                <a:solidFill>
+                  <a:schemeClr val="tx1"/>
+                </a:solidFill>
+                <a:latin typeface="+mj-lt"/>
+                <a:ea typeface="+mj-ea"/>
+                <a:cs typeface="+mj-cs"/>
+              </a:rPr>
+              <a:t>Retrieval Augmented Generation</a:t>
+            </a:r>
+          </a:p>
+        </p:txBody>
+      </p:sp>
+      <p:sp>
+        <p:nvSpPr>
+          <p:cNvPr id="16" name="sketch line">
+            <a:extLst>
+              <a:ext uri="{FF2B5EF4-FFF2-40B4-BE49-F238E27FC236}">
+                <a16:creationId xmlns:a16="http://schemas.microsoft.com/office/drawing/2014/main" id="{670CEDEF-4F34-412E-84EE-329C1E936AF5}"/>
+              </a:ext>
+              <a:ext uri="{C183D7F6-B498-43B3-948B-1728B52AA6E4}">
+                <adec:decorative xmlns:adec="http://schemas.microsoft.com/office/drawing/2017/decorative" val="1"/>
+              </a:ext>
+            </a:extLst>
+          </p:cNvPr>
+          <p:cNvSpPr>
+            <a:spLocks noGrp="1" noRot="1" noChangeAspect="1" noMove="1" noResize="1" noEditPoints="1" noAdjustHandles="1" noChangeArrowheads="1" noChangeShapeType="1" noTextEdit="1"/>
+          </p:cNvSpPr>
+          <p:nvPr>
+            <p:extLst>
+              <p:ext uri="{386F3935-93C4-4BCD-93E2-E3B085C9AB24}">
+                <p16:designElem xmlns:p16="http://schemas.microsoft.com/office/powerpoint/2015/main" val="1"/>
+              </p:ext>
+            </p:extLst>
+          </p:nvPr>
+        </p:nvSpPr>
+        <p:spPr>
+          <a:xfrm>
+            <a:off x="3807702" y="1733454"/>
+            <a:ext cx="4572000" cy="18288"/>
+          </a:xfrm>
+          <a:custGeom>
+            <a:avLst/>
+            <a:gdLst>
+              <a:gd name="connsiteX0" fmla="*/ 0 w 4572000"/>
+              <a:gd name="connsiteY0" fmla="*/ 0 h 18288"/>
+              <a:gd name="connsiteX1" fmla="*/ 515983 w 4572000"/>
+              <a:gd name="connsiteY1" fmla="*/ 0 h 18288"/>
+              <a:gd name="connsiteX2" fmla="*/ 1031966 w 4572000"/>
+              <a:gd name="connsiteY2" fmla="*/ 0 h 18288"/>
+              <a:gd name="connsiteX3" fmla="*/ 1639389 w 4572000"/>
+              <a:gd name="connsiteY3" fmla="*/ 0 h 18288"/>
+              <a:gd name="connsiteX4" fmla="*/ 2383971 w 4572000"/>
+              <a:gd name="connsiteY4" fmla="*/ 0 h 18288"/>
+              <a:gd name="connsiteX5" fmla="*/ 2945674 w 4572000"/>
+              <a:gd name="connsiteY5" fmla="*/ 0 h 18288"/>
+              <a:gd name="connsiteX6" fmla="*/ 3507377 w 4572000"/>
+              <a:gd name="connsiteY6" fmla="*/ 0 h 18288"/>
+              <a:gd name="connsiteX7" fmla="*/ 4572000 w 4572000"/>
+              <a:gd name="connsiteY7" fmla="*/ 0 h 18288"/>
+              <a:gd name="connsiteX8" fmla="*/ 4572000 w 4572000"/>
+              <a:gd name="connsiteY8" fmla="*/ 18288 h 18288"/>
+              <a:gd name="connsiteX9" fmla="*/ 3873137 w 4572000"/>
+              <a:gd name="connsiteY9" fmla="*/ 18288 h 18288"/>
+              <a:gd name="connsiteX10" fmla="*/ 3311434 w 4572000"/>
+              <a:gd name="connsiteY10" fmla="*/ 18288 h 18288"/>
+              <a:gd name="connsiteX11" fmla="*/ 2749731 w 4572000"/>
+              <a:gd name="connsiteY11" fmla="*/ 18288 h 18288"/>
+              <a:gd name="connsiteX12" fmla="*/ 2050869 w 4572000"/>
+              <a:gd name="connsiteY12" fmla="*/ 18288 h 18288"/>
+              <a:gd name="connsiteX13" fmla="*/ 1306286 w 4572000"/>
+              <a:gd name="connsiteY13" fmla="*/ 18288 h 18288"/>
+              <a:gd name="connsiteX14" fmla="*/ 790303 w 4572000"/>
+              <a:gd name="connsiteY14" fmla="*/ 18288 h 18288"/>
+              <a:gd name="connsiteX15" fmla="*/ 0 w 4572000"/>
+              <a:gd name="connsiteY15" fmla="*/ 18288 h 18288"/>
+              <a:gd name="connsiteX16" fmla="*/ 0 w 4572000"/>
+              <a:gd name="connsiteY16" fmla="*/ 0 h 18288"/>
+            </a:gdLst>
+            <a:ahLst/>
+            <a:cxnLst>
+              <a:cxn ang="0">
+                <a:pos x="connsiteX0" y="connsiteY0"/>
+              </a:cxn>
+              <a:cxn ang="0">
+                <a:pos x="connsiteX1" y="connsiteY1"/>
+              </a:cxn>
+              <a:cxn ang="0">
+                <a:pos x="connsiteX2" y="connsiteY2"/>
+              </a:cxn>
+              <a:cxn ang="0">
+                <a:pos x="connsiteX3" y="connsiteY3"/>
+              </a:cxn>
+              <a:cxn ang="0">
+                <a:pos x="connsiteX4" y="connsiteY4"/>
+              </a:cxn>
+              <a:cxn ang="0">
+                <a:pos x="connsiteX5" y="connsiteY5"/>
+              </a:cxn>
+              <a:cxn ang="0">
+                <a:pos x="connsiteX6" y="connsiteY6"/>
+              </a:cxn>
+              <a:cxn ang="0">
+                <a:pos x="connsiteX7" y="connsiteY7"/>
+              </a:cxn>
+              <a:cxn ang="0">
+                <a:pos x="connsiteX8" y="connsiteY8"/>
+              </a:cxn>
+              <a:cxn ang="0">
+                <a:pos x="connsiteX9" y="connsiteY9"/>
+              </a:cxn>
+              <a:cxn ang="0">
+                <a:pos x="connsiteX10" y="connsiteY10"/>
+              </a:cxn>
+              <a:cxn ang="0">
+                <a:pos x="connsiteX11" y="connsiteY11"/>
+              </a:cxn>
+              <a:cxn ang="0">
+                <a:pos x="connsiteX12" y="connsiteY12"/>
+              </a:cxn>
+              <a:cxn ang="0">
+                <a:pos x="connsiteX13" y="connsiteY13"/>
+              </a:cxn>
+              <a:cxn ang="0">
+                <a:pos x="connsiteX14" y="connsiteY14"/>
+              </a:cxn>
+              <a:cxn ang="0">
+                <a:pos x="connsiteX15" y="connsiteY15"/>
+              </a:cxn>
+              <a:cxn ang="0">
+                <a:pos x="connsiteX16" y="connsiteY16"/>
+              </a:cxn>
+            </a:cxnLst>
+            <a:rect l="l" t="t" r="r" b="b"/>
+            <a:pathLst>
+              <a:path w="4572000" h="18288" fill="none" extrusionOk="0">
+                <a:moveTo>
+                  <a:pt x="0" y="0"/>
+                </a:moveTo>
+                <a:cubicBezTo>
+                  <a:pt x="105156" y="-20963"/>
+                  <a:pt x="340432" y="822"/>
+                  <a:pt x="515983" y="0"/>
+                </a:cubicBezTo>
+                <a:cubicBezTo>
+                  <a:pt x="691534" y="-822"/>
+                  <a:pt x="850679" y="16479"/>
+                  <a:pt x="1031966" y="0"/>
+                </a:cubicBezTo>
+                <a:cubicBezTo>
+                  <a:pt x="1213253" y="-16479"/>
+                  <a:pt x="1443646" y="-18730"/>
+                  <a:pt x="1639389" y="0"/>
+                </a:cubicBezTo>
+                <a:cubicBezTo>
+                  <a:pt x="1835132" y="18730"/>
+                  <a:pt x="2159975" y="18531"/>
+                  <a:pt x="2383971" y="0"/>
+                </a:cubicBezTo>
+                <a:cubicBezTo>
+                  <a:pt x="2607967" y="-18531"/>
+                  <a:pt x="2719096" y="-12030"/>
+                  <a:pt x="2945674" y="0"/>
+                </a:cubicBezTo>
+                <a:cubicBezTo>
+                  <a:pt x="3172252" y="12030"/>
+                  <a:pt x="3269167" y="27666"/>
+                  <a:pt x="3507377" y="0"/>
+                </a:cubicBezTo>
+                <a:cubicBezTo>
+                  <a:pt x="3745587" y="-27666"/>
+                  <a:pt x="4116741" y="18705"/>
+                  <a:pt x="4572000" y="0"/>
+                </a:cubicBezTo>
+                <a:cubicBezTo>
+                  <a:pt x="4572895" y="8974"/>
+                  <a:pt x="4571454" y="9359"/>
+                  <a:pt x="4572000" y="18288"/>
+                </a:cubicBezTo>
+                <a:cubicBezTo>
+                  <a:pt x="4374698" y="3942"/>
+                  <a:pt x="4098874" y="-11042"/>
+                  <a:pt x="3873137" y="18288"/>
+                </a:cubicBezTo>
+                <a:cubicBezTo>
+                  <a:pt x="3647400" y="47618"/>
+                  <a:pt x="3517055" y="5421"/>
+                  <a:pt x="3311434" y="18288"/>
+                </a:cubicBezTo>
+                <a:cubicBezTo>
+                  <a:pt x="3105813" y="31155"/>
+                  <a:pt x="3025168" y="17856"/>
+                  <a:pt x="2749731" y="18288"/>
+                </a:cubicBezTo>
+                <a:cubicBezTo>
+                  <a:pt x="2474294" y="18720"/>
+                  <a:pt x="2291766" y="-14168"/>
+                  <a:pt x="2050869" y="18288"/>
+                </a:cubicBezTo>
+                <a:cubicBezTo>
+                  <a:pt x="1809972" y="50744"/>
+                  <a:pt x="1540276" y="46798"/>
+                  <a:pt x="1306286" y="18288"/>
+                </a:cubicBezTo>
+                <a:cubicBezTo>
+                  <a:pt x="1072296" y="-10222"/>
+                  <a:pt x="972445" y="19645"/>
+                  <a:pt x="790303" y="18288"/>
+                </a:cubicBezTo>
+                <a:cubicBezTo>
+                  <a:pt x="608161" y="16931"/>
+                  <a:pt x="200981" y="8241"/>
+                  <a:pt x="0" y="18288"/>
+                </a:cubicBezTo>
+                <a:cubicBezTo>
+                  <a:pt x="-229" y="14222"/>
+                  <a:pt x="509" y="5816"/>
+                  <a:pt x="0" y="0"/>
+                </a:cubicBezTo>
+                <a:close/>
+              </a:path>
+              <a:path w="4572000" h="18288" stroke="0" extrusionOk="0">
+                <a:moveTo>
+                  <a:pt x="0" y="0"/>
+                </a:moveTo>
+                <a:cubicBezTo>
+                  <a:pt x="143285" y="-9565"/>
+                  <a:pt x="327959" y="-11498"/>
+                  <a:pt x="561703" y="0"/>
+                </a:cubicBezTo>
+                <a:cubicBezTo>
+                  <a:pt x="795447" y="11498"/>
+                  <a:pt x="838260" y="18255"/>
+                  <a:pt x="1077686" y="0"/>
+                </a:cubicBezTo>
+                <a:cubicBezTo>
+                  <a:pt x="1317112" y="-18255"/>
+                  <a:pt x="1437472" y="23514"/>
+                  <a:pt x="1639389" y="0"/>
+                </a:cubicBezTo>
+                <a:cubicBezTo>
+                  <a:pt x="1841306" y="-23514"/>
+                  <a:pt x="2037142" y="-12551"/>
+                  <a:pt x="2292531" y="0"/>
+                </a:cubicBezTo>
+                <a:cubicBezTo>
+                  <a:pt x="2547920" y="12551"/>
+                  <a:pt x="2810436" y="-20352"/>
+                  <a:pt x="2991394" y="0"/>
+                </a:cubicBezTo>
+                <a:cubicBezTo>
+                  <a:pt x="3172352" y="20352"/>
+                  <a:pt x="3530025" y="-13347"/>
+                  <a:pt x="3735977" y="0"/>
+                </a:cubicBezTo>
+                <a:cubicBezTo>
+                  <a:pt x="3941929" y="13347"/>
+                  <a:pt x="4161497" y="34086"/>
+                  <a:pt x="4572000" y="0"/>
+                </a:cubicBezTo>
+                <a:cubicBezTo>
+                  <a:pt x="4571545" y="6162"/>
+                  <a:pt x="4571903" y="11775"/>
+                  <a:pt x="4572000" y="18288"/>
+                </a:cubicBezTo>
+                <a:cubicBezTo>
+                  <a:pt x="4228040" y="36490"/>
+                  <a:pt x="4199736" y="42557"/>
+                  <a:pt x="3873137" y="18288"/>
+                </a:cubicBezTo>
+                <a:cubicBezTo>
+                  <a:pt x="3546538" y="-5981"/>
+                  <a:pt x="3472124" y="16809"/>
+                  <a:pt x="3128554" y="18288"/>
+                </a:cubicBezTo>
+                <a:cubicBezTo>
+                  <a:pt x="2784984" y="19767"/>
+                  <a:pt x="2735896" y="-17781"/>
+                  <a:pt x="2383971" y="18288"/>
+                </a:cubicBezTo>
+                <a:cubicBezTo>
+                  <a:pt x="2032046" y="54357"/>
+                  <a:pt x="2019324" y="2920"/>
+                  <a:pt x="1867989" y="18288"/>
+                </a:cubicBezTo>
+                <a:cubicBezTo>
+                  <a:pt x="1716654" y="33656"/>
+                  <a:pt x="1418675" y="32575"/>
+                  <a:pt x="1169126" y="18288"/>
+                </a:cubicBezTo>
+                <a:cubicBezTo>
+                  <a:pt x="919577" y="4001"/>
+                  <a:pt x="798537" y="16165"/>
+                  <a:pt x="561703" y="18288"/>
+                </a:cubicBezTo>
+                <a:cubicBezTo>
+                  <a:pt x="324869" y="20411"/>
+                  <a:pt x="221395" y="-912"/>
+                  <a:pt x="0" y="18288"/>
+                </a:cubicBezTo>
+                <a:cubicBezTo>
+                  <a:pt x="766" y="10800"/>
+                  <a:pt x="-457" y="8180"/>
+                  <a:pt x="0" y="0"/>
+                </a:cubicBezTo>
+                <a:close/>
+              </a:path>
+            </a:pathLst>
+          </a:custGeom>
+          <a:solidFill>
+            <a:schemeClr val="accent2"/>
+          </a:solidFill>
+          <a:ln w="41275" cap="rnd">
+            <a:solidFill>
+              <a:schemeClr val="accent2"/>
+            </a:solidFill>
+            <a:round/>
+            <a:extLst>
+              <a:ext uri="{C807C97D-BFC1-408E-A445-0C87EB9F89A2}">
+                <ask:lineSketchStyleProps xmlns:ask="http://schemas.microsoft.com/office/drawing/2018/sketchyshapes" sd="2727557108">
+                  <a:prstGeom prst="rect">
+                    <a:avLst/>
+                  </a:prstGeom>
+                  <ask:type>
+                    <ask:lineSketchFreehand/>
+                  </ask:type>
+                </ask:lineSketchStyleProps>
+              </a:ext>
+            </a:extLst>
+          </a:ln>
+        </p:spPr>
+        <p:style>
+          <a:lnRef idx="2">
+            <a:schemeClr val="accent1">
+              <a:shade val="50000"/>
+            </a:schemeClr>
+          </a:lnRef>
+          <a:fillRef idx="1">
+            <a:schemeClr val="accent1"/>
+          </a:fillRef>
+          <a:effectRef idx="0">
+            <a:schemeClr val="accent1"/>
+          </a:effectRef>
+          <a:fontRef idx="minor">
+            <a:schemeClr val="lt1"/>
+          </a:fontRef>
+        </p:style>
+        <p:txBody>
+          <a:bodyPr rtlCol="0" anchor="ctr"/>
+          <a:lstStyle/>
+          <a:p>
+            <a:pPr algn="ctr"/>
+            <a:endParaRPr lang="en-US"/>
+          </a:p>
+        </p:txBody>
+      </p:sp>
+      <p:sp>
+        <p:nvSpPr>
+          <p:cNvPr id="6" name="Dátum helye 5">
+            <a:extLst>
+              <a:ext uri="{FF2B5EF4-FFF2-40B4-BE49-F238E27FC236}">
+                <a16:creationId xmlns:a16="http://schemas.microsoft.com/office/drawing/2014/main" id="{6484474F-5500-8FDB-CF4B-D9EE49C3C53C}"/>
+              </a:ext>
+            </a:extLst>
+          </p:cNvPr>
+          <p:cNvSpPr>
+            <a:spLocks noGrp="1"/>
+          </p:cNvSpPr>
+          <p:nvPr>
+            <p:ph type="dt" sz="half" idx="10"/>
+          </p:nvPr>
+        </p:nvSpPr>
+        <p:spPr/>
+        <p:txBody>
+          <a:bodyPr/>
+          <a:lstStyle/>
+          <a:p>
+            <a:fld id="{5C85A438-3713-F446-BD7A-55D18856C613}" type="datetime1">
+              <a:rPr lang="hu-HU" smtClean="0"/>
+              <a:t>2025. 11. 06.</a:t>
+            </a:fld>
+            <a:endParaRPr lang="hu-HU"/>
+          </a:p>
+        </p:txBody>
+      </p:sp>
+      <p:sp>
+        <p:nvSpPr>
+          <p:cNvPr id="7" name="Dia számának helye 6">
+            <a:extLst>
+              <a:ext uri="{FF2B5EF4-FFF2-40B4-BE49-F238E27FC236}">
+                <a16:creationId xmlns:a16="http://schemas.microsoft.com/office/drawing/2014/main" id="{15212F9E-E412-BF89-1EF4-37D10781E699}"/>
+              </a:ext>
+            </a:extLst>
+          </p:cNvPr>
+          <p:cNvSpPr>
+            <a:spLocks noGrp="1"/>
+          </p:cNvSpPr>
+          <p:nvPr>
+            <p:ph type="sldNum" sz="quarter" idx="12"/>
+          </p:nvPr>
+        </p:nvSpPr>
+        <p:spPr/>
+        <p:txBody>
+          <a:bodyPr/>
+          <a:lstStyle/>
+          <a:p>
+            <a:fld id="{61F88ADF-3301-4598-B089-C6A4CC92BE83}" type="slidenum">
+              <a:rPr lang="hu-HU" smtClean="0"/>
+              <a:t>2</a:t>
+            </a:fld>
+            <a:r>
+              <a:rPr lang="hu-HU" dirty="0"/>
+              <a:t>/14</a:t>
+            </a:r>
+          </a:p>
+        </p:txBody>
+      </p:sp>
+      <p:pic>
+        <p:nvPicPr>
+          <p:cNvPr id="14" name="Tartalom helye 13" descr="A képen képernyőkép, diagram, tervezés látható&#10;&#10;Automatikusan generált leírás">
+            <a:extLst>
+              <a:ext uri="{FF2B5EF4-FFF2-40B4-BE49-F238E27FC236}">
+                <a16:creationId xmlns:a16="http://schemas.microsoft.com/office/drawing/2014/main" id="{39C365F9-1952-04F6-0DD6-246F05AEF7A6}"/>
+              </a:ext>
+            </a:extLst>
+          </p:cNvPr>
+          <p:cNvPicPr>
+            <a:picLocks noGrp="1" noChangeAspect="1"/>
+          </p:cNvPicPr>
+          <p:nvPr>
+            <p:ph idx="1"/>
+          </p:nvPr>
+        </p:nvPicPr>
+        <p:blipFill>
+          <a:blip r:embed="rId2">
+            <a:extLst>
+              <a:ext uri="{28A0092B-C50C-407E-A947-70E740481C1C}">
+                <a14:useLocalDpi xmlns:a14="http://schemas.microsoft.com/office/drawing/2010/main" val="0"/>
+              </a:ext>
+            </a:extLst>
+          </a:blip>
+          <a:stretch>
+            <a:fillRect/>
+          </a:stretch>
+        </p:blipFill>
+        <p:spPr>
+          <a:xfrm>
+            <a:off x="200175" y="2297565"/>
+            <a:ext cx="11787051" cy="3428190"/>
+          </a:xfrm>
+        </p:spPr>
+      </p:pic>
+    </p:spTree>
+    <p:extLst>
+      <p:ext uri="{BB962C8B-B14F-4D97-AF65-F5344CB8AC3E}">
+        <p14:creationId xmlns:p14="http://schemas.microsoft.com/office/powerpoint/2010/main" val="2090047926"/>
+      </p:ext>
+    </p:extLst>
+  </p:cSld>
+  <p:clrMapOvr>
+    <a:masterClrMapping/>
+  </p:clrMapOvr>
+</p:sld>
+</file>
+
+<file path=ppt/slides/slide20.xml><?xml version="1.0" encoding="utf-8"?>
 <p:sld xmlns:a="http://schemas.openxmlformats.org/drawingml/2006/main" xmlns:r="http://schemas.openxmlformats.org/officeDocument/2006/relationships" xmlns:p="http://schemas.openxmlformats.org/presentationml/2006/main">
   <p:cSld>
     <p:bg>
@@ -5955,25 +7834,6 @@
             <a:endParaRPr lang="hu-HU" sz="2200" dirty="0"/>
           </a:p>
           <a:p>
-            <a:r>
-              <a:rPr lang="hu-HU" sz="2200" dirty="0"/>
-              <a:t>Esetleg </a:t>
-            </a:r>
-            <a:r>
-              <a:rPr lang="hu-HU" sz="2200" dirty="0" err="1"/>
-              <a:t>vsi</a:t>
-            </a:r>
-            <a:r>
-              <a:rPr lang="hu-HU" sz="2200" dirty="0"/>
-              <a:t> táblák kipróbálása és használata online </a:t>
-            </a:r>
-            <a:r>
-              <a:rPr lang="hu-HU" sz="2200" dirty="0" err="1"/>
-              <a:t>klaszterezéssel</a:t>
-            </a:r>
-            <a:endParaRPr lang="hu-HU" sz="2200" dirty="0"/>
-          </a:p>
-          <a:p>
             <a:pPr marL="1371600" lvl="2" indent="-457200">
               <a:buFont typeface="+mj-lt"/>
               <a:buAutoNum type="arabicPeriod"/>
@@ -6022,7 +7882,7 @@
                   <a:spcPts val="600"/>
                 </a:spcAft>
               </a:pPr>
-              <a:t>2025. 11. 05.</a:t>
+              <a:t>2025. 11. 06.</a:t>
             </a:fld>
             <a:endParaRPr lang="hu-HU"/>
           </a:p>
@@ -6068,7 +7928,7 @@
                   <a:spcPts val="600"/>
                 </a:spcAft>
               </a:pPr>
-              <a:t>15</a:t>
+              <a:t>20</a:t>
             </a:fld>
             <a:r>
               <a:rPr lang="hu-HU" dirty="0"/>
@@ -6091,7 +7951,7 @@
 </p:sld>
 </file>
 
-<file path=ppt/slides/slide16.xml><?xml version="1.0" encoding="utf-8"?>
+<file path=ppt/slides/slide21.xml><?xml version="1.0" encoding="utf-8"?>
 <p:sld xmlns:a="http://schemas.openxmlformats.org/drawingml/2006/main" xmlns:r="http://schemas.openxmlformats.org/officeDocument/2006/relationships" xmlns:p="http://schemas.openxmlformats.org/presentationml/2006/main">
   <p:cSld>
     <p:bg>
@@ -6631,7 +8491,7 @@
 </p:sld>
 </file>
 
-<file path=ppt/slides/slide17.xml><?xml version="1.0" encoding="utf-8"?>
+<file path=ppt/slides/slide22.xml><?xml version="1.0" encoding="utf-8"?>
 <p:sld xmlns:a="http://schemas.openxmlformats.org/drawingml/2006/main" xmlns:r="http://schemas.openxmlformats.org/officeDocument/2006/relationships" xmlns:p="http://schemas.openxmlformats.org/presentationml/2006/main">
   <p:cSld>
     <p:spTree>
@@ -6892,7 +8752,7 @@
           <a:p>
             <a:fld id="{A3369F3F-A62C-A143-BDC3-1E7D9C7303DA}" type="datetime1">
               <a:rPr lang="hu-HU" smtClean="0"/>
-              <a:t>2025. 11. 05.</a:t>
+              <a:t>2025. 11. 06.</a:t>
             </a:fld>
             <a:endParaRPr lang="hu-HU"/>
           </a:p>
@@ -6921,7 +8781,7 @@
           <a:p>
             <a:fld id="{61F88ADF-3301-4598-B089-C6A4CC92BE83}" type="slidenum">
               <a:rPr lang="hu-HU" smtClean="0"/>
-              <a:t>17</a:t>
+              <a:t>22</a:t>
             </a:fld>
             <a:r>
               <a:rPr lang="hu-HU" dirty="0"/>
@@ -6934,586 +8794,6 @@
     <p:extLst>
       <p:ext uri="{BB962C8B-B14F-4D97-AF65-F5344CB8AC3E}">
         <p14:creationId xmlns:p14="http://schemas.microsoft.com/office/powerpoint/2010/main" val="2015096485"/>
-      </p:ext>
-    </p:extLst>
-  </p:cSld>
-  <p:clrMapOvr>
-    <a:masterClrMapping/>
-  </p:clrMapOvr>
-</p:sld>
-</file>
-
-<file path=ppt/slides/slide2.xml><?xml version="1.0" encoding="utf-8"?>
-<p:sld xmlns:a="http://schemas.openxmlformats.org/drawingml/2006/main" xmlns:r="http://schemas.openxmlformats.org/officeDocument/2006/relationships" xmlns:p="http://schemas.openxmlformats.org/presentationml/2006/main">
-  <p:cSld>
-    <p:bg>
-      <p:bgPr>
-        <a:solidFill>
-          <a:schemeClr val="bg1"/>
-        </a:solidFill>
-        <a:effectLst/>
-      </p:bgPr>
-    </p:bg>
-    <p:spTree>
-      <p:nvGrpSpPr>
-        <p:cNvPr id="1" name=""/>
-        <p:cNvGrpSpPr/>
-        <p:nvPr/>
-      </p:nvGrpSpPr>
-      <p:grpSpPr>
-        <a:xfrm>
-          <a:off x="0" y="0"/>
-          <a:ext cx="0" cy="0"/>
-          <a:chOff x="0" y="0"/>
-          <a:chExt cx="0" cy="0"/>
-        </a:xfrm>
-      </p:grpSpPr>
-      <p:sp useBgFill="1">
-        <p:nvSpPr>
-          <p:cNvPr id="10" name="Rectangle 9">
-            <a:extLst>
-              <a:ext uri="{FF2B5EF4-FFF2-40B4-BE49-F238E27FC236}">
-                <a16:creationId xmlns:a16="http://schemas.microsoft.com/office/drawing/2014/main" id="{BCED4D40-4B67-4331-AC48-79B82B4A47D8}"/>
-              </a:ext>
-              <a:ext uri="{C183D7F6-B498-43B3-948B-1728B52AA6E4}">
-                <adec:decorative xmlns:adec="http://schemas.microsoft.com/office/drawing/2017/decorative" val="1"/>
-              </a:ext>
-            </a:extLst>
-          </p:cNvPr>
-          <p:cNvSpPr>
-            <a:spLocks noGrp="1" noRot="1" noChangeAspect="1" noMove="1" noResize="1" noEditPoints="1" noAdjustHandles="1" noChangeArrowheads="1" noChangeShapeType="1" noTextEdit="1"/>
-          </p:cNvSpPr>
-          <p:nvPr>
-            <p:extLst>
-              <p:ext uri="{386F3935-93C4-4BCD-93E2-E3B085C9AB24}">
-                <p16:designElem xmlns:p16="http://schemas.microsoft.com/office/powerpoint/2015/main" val="1"/>
-              </p:ext>
-            </p:extLst>
-          </p:nvPr>
-        </p:nvSpPr>
-        <p:spPr>
-          <a:xfrm>
-            <a:off x="0" y="0"/>
-            <a:ext cx="12192000" cy="6858000"/>
-          </a:xfrm>
-          <a:prstGeom prst="rect">
-            <a:avLst/>
-          </a:prstGeom>
-          <a:ln>
-            <a:noFill/>
-          </a:ln>
-        </p:spPr>
-        <p:style>
-          <a:lnRef idx="2">
-            <a:schemeClr val="accent1">
-              <a:shade val="50000"/>
-            </a:schemeClr>
-          </a:lnRef>
-          <a:fillRef idx="1">
-            <a:schemeClr val="accent1"/>
-          </a:fillRef>
-          <a:effectRef idx="0">
-            <a:schemeClr val="accent1"/>
-          </a:effectRef>
-          <a:fontRef idx="minor">
-            <a:schemeClr val="lt1"/>
-          </a:fontRef>
-        </p:style>
-        <p:txBody>
-          <a:bodyPr rtlCol="0" anchor="ctr"/>
-          <a:lstStyle/>
-          <a:p>
-            <a:pPr algn="ctr"/>
-            <a:endParaRPr lang="en-US"/>
-          </a:p>
-        </p:txBody>
-      </p:sp>
-      <p:sp>
-        <p:nvSpPr>
-          <p:cNvPr id="2" name="Cím 1">
-            <a:extLst>
-              <a:ext uri="{FF2B5EF4-FFF2-40B4-BE49-F238E27FC236}">
-                <a16:creationId xmlns:a16="http://schemas.microsoft.com/office/drawing/2014/main" id="{776A5C5B-9E91-0643-44A3-847AC216A035}"/>
-              </a:ext>
-            </a:extLst>
-          </p:cNvPr>
-          <p:cNvSpPr>
-            <a:spLocks noGrp="1"/>
-          </p:cNvSpPr>
-          <p:nvPr>
-            <p:ph type="title"/>
-          </p:nvPr>
-        </p:nvSpPr>
-        <p:spPr>
-          <a:xfrm>
-            <a:off x="638881" y="417576"/>
-            <a:ext cx="10909640" cy="1249394"/>
-          </a:xfrm>
-        </p:spPr>
-        <p:txBody>
-          <a:bodyPr vert="horz" lIns="91440" tIns="45720" rIns="91440" bIns="45720" rtlCol="0" anchor="ctr">
-            <a:normAutofit/>
-          </a:bodyPr>
-          <a:lstStyle/>
-          <a:p>
-            <a:pPr algn="ctr"/>
-            <a:r>
-              <a:rPr lang="en-US" sz="6100" b="1" kern="1200" dirty="0">
-                <a:solidFill>
-                  <a:schemeClr val="tx1"/>
-                </a:solidFill>
-                <a:latin typeface="+mj-lt"/>
-                <a:ea typeface="+mj-ea"/>
-                <a:cs typeface="+mj-cs"/>
-              </a:rPr>
-              <a:t>Retrieval Augmented Generation</a:t>
-            </a:r>
-          </a:p>
-        </p:txBody>
-      </p:sp>
-      <p:sp>
-        <p:nvSpPr>
-          <p:cNvPr id="16" name="sketch line">
-            <a:extLst>
-              <a:ext uri="{FF2B5EF4-FFF2-40B4-BE49-F238E27FC236}">
-                <a16:creationId xmlns:a16="http://schemas.microsoft.com/office/drawing/2014/main" id="{670CEDEF-4F34-412E-84EE-329C1E936AF5}"/>
-              </a:ext>
-              <a:ext uri="{C183D7F6-B498-43B3-948B-1728B52AA6E4}">
-                <adec:decorative xmlns:adec="http://schemas.microsoft.com/office/drawing/2017/decorative" val="1"/>
-              </a:ext>
-            </a:extLst>
-          </p:cNvPr>
-          <p:cNvSpPr>
-            <a:spLocks noGrp="1" noRot="1" noChangeAspect="1" noMove="1" noResize="1" noEditPoints="1" noAdjustHandles="1" noChangeArrowheads="1" noChangeShapeType="1" noTextEdit="1"/>
-          </p:cNvSpPr>
-          <p:nvPr>
-            <p:extLst>
-              <p:ext uri="{386F3935-93C4-4BCD-93E2-E3B085C9AB24}">
-                <p16:designElem xmlns:p16="http://schemas.microsoft.com/office/powerpoint/2015/main" val="1"/>
-              </p:ext>
-            </p:extLst>
-          </p:nvPr>
-        </p:nvSpPr>
-        <p:spPr>
-          <a:xfrm>
-            <a:off x="3807702" y="1733454"/>
-            <a:ext cx="4572000" cy="18288"/>
-          </a:xfrm>
-          <a:custGeom>
-            <a:avLst/>
-            <a:gdLst>
-              <a:gd name="connsiteX0" fmla="*/ 0 w 4572000"/>
-              <a:gd name="connsiteY0" fmla="*/ 0 h 18288"/>
-              <a:gd name="connsiteX1" fmla="*/ 515983 w 4572000"/>
-              <a:gd name="connsiteY1" fmla="*/ 0 h 18288"/>
-              <a:gd name="connsiteX2" fmla="*/ 1031966 w 4572000"/>
-              <a:gd name="connsiteY2" fmla="*/ 0 h 18288"/>
-              <a:gd name="connsiteX3" fmla="*/ 1639389 w 4572000"/>
-              <a:gd name="connsiteY3" fmla="*/ 0 h 18288"/>
-              <a:gd name="connsiteX4" fmla="*/ 2383971 w 4572000"/>
-              <a:gd name="connsiteY4" fmla="*/ 0 h 18288"/>
-              <a:gd name="connsiteX5" fmla="*/ 2945674 w 4572000"/>
-              <a:gd name="connsiteY5" fmla="*/ 0 h 18288"/>
-              <a:gd name="connsiteX6" fmla="*/ 3507377 w 4572000"/>
-              <a:gd name="connsiteY6" fmla="*/ 0 h 18288"/>
-              <a:gd name="connsiteX7" fmla="*/ 4572000 w 4572000"/>
-              <a:gd name="connsiteY7" fmla="*/ 0 h 18288"/>
-              <a:gd name="connsiteX8" fmla="*/ 4572000 w 4572000"/>
-              <a:gd name="connsiteY8" fmla="*/ 18288 h 18288"/>
-              <a:gd name="connsiteX9" fmla="*/ 3873137 w 4572000"/>
-              <a:gd name="connsiteY9" fmla="*/ 18288 h 18288"/>
-              <a:gd name="connsiteX10" fmla="*/ 3311434 w 4572000"/>
-              <a:gd name="connsiteY10" fmla="*/ 18288 h 18288"/>
-              <a:gd name="connsiteX11" fmla="*/ 2749731 w 4572000"/>
-              <a:gd name="connsiteY11" fmla="*/ 18288 h 18288"/>
-              <a:gd name="connsiteX12" fmla="*/ 2050869 w 4572000"/>
-              <a:gd name="connsiteY12" fmla="*/ 18288 h 18288"/>
-              <a:gd name="connsiteX13" fmla="*/ 1306286 w 4572000"/>
-              <a:gd name="connsiteY13" fmla="*/ 18288 h 18288"/>
-              <a:gd name="connsiteX14" fmla="*/ 790303 w 4572000"/>
-              <a:gd name="connsiteY14" fmla="*/ 18288 h 18288"/>
-              <a:gd name="connsiteX15" fmla="*/ 0 w 4572000"/>
-              <a:gd name="connsiteY15" fmla="*/ 18288 h 18288"/>
-              <a:gd name="connsiteX16" fmla="*/ 0 w 4572000"/>
-              <a:gd name="connsiteY16" fmla="*/ 0 h 18288"/>
-            </a:gdLst>
-            <a:ahLst/>
-            <a:cxnLst>
-              <a:cxn ang="0">
-                <a:pos x="connsiteX0" y="connsiteY0"/>
-              </a:cxn>
-              <a:cxn ang="0">
-                <a:pos x="connsiteX1" y="connsiteY1"/>
-              </a:cxn>
-              <a:cxn ang="0">
-                <a:pos x="connsiteX2" y="connsiteY2"/>
-              </a:cxn>
-              <a:cxn ang="0">
-                <a:pos x="connsiteX3" y="connsiteY3"/>
-              </a:cxn>
-              <a:cxn ang="0">
-                <a:pos x="connsiteX4" y="connsiteY4"/>
-              </a:cxn>
-              <a:cxn ang="0">
-                <a:pos x="connsiteX5" y="connsiteY5"/>
-              </a:cxn>
-              <a:cxn ang="0">
-                <a:pos x="connsiteX6" y="connsiteY6"/>
-              </a:cxn>
-              <a:cxn ang="0">
-                <a:pos x="connsiteX7" y="connsiteY7"/>
-              </a:cxn>
-              <a:cxn ang="0">
-                <a:pos x="connsiteX8" y="connsiteY8"/>
-              </a:cxn>
-              <a:cxn ang="0">
-                <a:pos x="connsiteX9" y="connsiteY9"/>
-              </a:cxn>
-              <a:cxn ang="0">
-                <a:pos x="connsiteX10" y="connsiteY10"/>
-              </a:cxn>
-              <a:cxn ang="0">
-                <a:pos x="connsiteX11" y="connsiteY11"/>
-              </a:cxn>
-              <a:cxn ang="0">
-                <a:pos x="connsiteX12" y="connsiteY12"/>
-              </a:cxn>
-              <a:cxn ang="0">
-                <a:pos x="connsiteX13" y="connsiteY13"/>
-              </a:cxn>
-              <a:cxn ang="0">
-                <a:pos x="connsiteX14" y="connsiteY14"/>
-              </a:cxn>
-              <a:cxn ang="0">
-                <a:pos x="connsiteX15" y="connsiteY15"/>
-              </a:cxn>
-              <a:cxn ang="0">
-                <a:pos x="connsiteX16" y="connsiteY16"/>
-              </a:cxn>
-            </a:cxnLst>
-            <a:rect l="l" t="t" r="r" b="b"/>
-            <a:pathLst>
-              <a:path w="4572000" h="18288" fill="none" extrusionOk="0">
-                <a:moveTo>
-                  <a:pt x="0" y="0"/>
-                </a:moveTo>
-                <a:cubicBezTo>
-                  <a:pt x="105156" y="-20963"/>
-                  <a:pt x="340432" y="822"/>
-                  <a:pt x="515983" y="0"/>
-                </a:cubicBezTo>
-                <a:cubicBezTo>
-                  <a:pt x="691534" y="-822"/>
-                  <a:pt x="850679" y="16479"/>
-                  <a:pt x="1031966" y="0"/>
-                </a:cubicBezTo>
-                <a:cubicBezTo>
-                  <a:pt x="1213253" y="-16479"/>
-                  <a:pt x="1443646" y="-18730"/>
-                  <a:pt x="1639389" y="0"/>
-                </a:cubicBezTo>
-                <a:cubicBezTo>
-                  <a:pt x="1835132" y="18730"/>
-                  <a:pt x="2159975" y="18531"/>
-                  <a:pt x="2383971" y="0"/>
-                </a:cubicBezTo>
-                <a:cubicBezTo>
-                  <a:pt x="2607967" y="-18531"/>
-                  <a:pt x="2719096" y="-12030"/>
-                  <a:pt x="2945674" y="0"/>
-                </a:cubicBezTo>
-                <a:cubicBezTo>
-                  <a:pt x="3172252" y="12030"/>
-                  <a:pt x="3269167" y="27666"/>
-                  <a:pt x="3507377" y="0"/>
-                </a:cubicBezTo>
-                <a:cubicBezTo>
-                  <a:pt x="3745587" y="-27666"/>
-                  <a:pt x="4116741" y="18705"/>
-                  <a:pt x="4572000" y="0"/>
-                </a:cubicBezTo>
-                <a:cubicBezTo>
-                  <a:pt x="4572895" y="8974"/>
-                  <a:pt x="4571454" y="9359"/>
-                  <a:pt x="4572000" y="18288"/>
-                </a:cubicBezTo>
-                <a:cubicBezTo>
-                  <a:pt x="4374698" y="3942"/>
-                  <a:pt x="4098874" y="-11042"/>
-                  <a:pt x="3873137" y="18288"/>
-                </a:cubicBezTo>
-                <a:cubicBezTo>
-                  <a:pt x="3647400" y="47618"/>
-                  <a:pt x="3517055" y="5421"/>
-                  <a:pt x="3311434" y="18288"/>
-                </a:cubicBezTo>
-                <a:cubicBezTo>
-                  <a:pt x="3105813" y="31155"/>
-                  <a:pt x="3025168" y="17856"/>
-                  <a:pt x="2749731" y="18288"/>
-                </a:cubicBezTo>
-                <a:cubicBezTo>
-                  <a:pt x="2474294" y="18720"/>
-                  <a:pt x="2291766" y="-14168"/>
-                  <a:pt x="2050869" y="18288"/>
-                </a:cubicBezTo>
-                <a:cubicBezTo>
-                  <a:pt x="1809972" y="50744"/>
-                  <a:pt x="1540276" y="46798"/>
-                  <a:pt x="1306286" y="18288"/>
-                </a:cubicBezTo>
-                <a:cubicBezTo>
-                  <a:pt x="1072296" y="-10222"/>
-                  <a:pt x="972445" y="19645"/>
-                  <a:pt x="790303" y="18288"/>
-                </a:cubicBezTo>
-                <a:cubicBezTo>
-                  <a:pt x="608161" y="16931"/>
-                  <a:pt x="200981" y="8241"/>
-                  <a:pt x="0" y="18288"/>
-                </a:cubicBezTo>
-                <a:cubicBezTo>
-                  <a:pt x="-229" y="14222"/>
-                  <a:pt x="509" y="5816"/>
-                  <a:pt x="0" y="0"/>
-                </a:cubicBezTo>
-                <a:close/>
-              </a:path>
-              <a:path w="4572000" h="18288" stroke="0" extrusionOk="0">
-                <a:moveTo>
-                  <a:pt x="0" y="0"/>
-                </a:moveTo>
-                <a:cubicBezTo>
-                  <a:pt x="143285" y="-9565"/>
-                  <a:pt x="327959" y="-11498"/>
-                  <a:pt x="561703" y="0"/>
-                </a:cubicBezTo>
-                <a:cubicBezTo>
-                  <a:pt x="795447" y="11498"/>
-                  <a:pt x="838260" y="18255"/>
-                  <a:pt x="1077686" y="0"/>
-                </a:cubicBezTo>
-                <a:cubicBezTo>
-                  <a:pt x="1317112" y="-18255"/>
-                  <a:pt x="1437472" y="23514"/>
-                  <a:pt x="1639389" y="0"/>
-                </a:cubicBezTo>
-                <a:cubicBezTo>
-                  <a:pt x="1841306" y="-23514"/>
-                  <a:pt x="2037142" y="-12551"/>
-                  <a:pt x="2292531" y="0"/>
-                </a:cubicBezTo>
-                <a:cubicBezTo>
-                  <a:pt x="2547920" y="12551"/>
-                  <a:pt x="2810436" y="-20352"/>
-                  <a:pt x="2991394" y="0"/>
-                </a:cubicBezTo>
-                <a:cubicBezTo>
-                  <a:pt x="3172352" y="20352"/>
-                  <a:pt x="3530025" y="-13347"/>
-                  <a:pt x="3735977" y="0"/>
-                </a:cubicBezTo>
-                <a:cubicBezTo>
-                  <a:pt x="3941929" y="13347"/>
-                  <a:pt x="4161497" y="34086"/>
-                  <a:pt x="4572000" y="0"/>
-                </a:cubicBezTo>
-                <a:cubicBezTo>
-                  <a:pt x="4571545" y="6162"/>
-                  <a:pt x="4571903" y="11775"/>
-                  <a:pt x="4572000" y="18288"/>
-                </a:cubicBezTo>
-                <a:cubicBezTo>
-                  <a:pt x="4228040" y="36490"/>
-                  <a:pt x="4199736" y="42557"/>
-                  <a:pt x="3873137" y="18288"/>
-                </a:cubicBezTo>
-                <a:cubicBezTo>
-                  <a:pt x="3546538" y="-5981"/>
-                  <a:pt x="3472124" y="16809"/>
-                  <a:pt x="3128554" y="18288"/>
-                </a:cubicBezTo>
-                <a:cubicBezTo>
-                  <a:pt x="2784984" y="19767"/>
-                  <a:pt x="2735896" y="-17781"/>
-                  <a:pt x="2383971" y="18288"/>
-                </a:cubicBezTo>
-                <a:cubicBezTo>
-                  <a:pt x="2032046" y="54357"/>
-                  <a:pt x="2019324" y="2920"/>
-                  <a:pt x="1867989" y="18288"/>
-                </a:cubicBezTo>
-                <a:cubicBezTo>
-                  <a:pt x="1716654" y="33656"/>
-                  <a:pt x="1418675" y="32575"/>
-                  <a:pt x="1169126" y="18288"/>
-                </a:cubicBezTo>
-                <a:cubicBezTo>
-                  <a:pt x="919577" y="4001"/>
-                  <a:pt x="798537" y="16165"/>
-                  <a:pt x="561703" y="18288"/>
-                </a:cubicBezTo>
-                <a:cubicBezTo>
-                  <a:pt x="324869" y="20411"/>
-                  <a:pt x="221395" y="-912"/>
-                  <a:pt x="0" y="18288"/>
-                </a:cubicBezTo>
-                <a:cubicBezTo>
-                  <a:pt x="766" y="10800"/>
-                  <a:pt x="-457" y="8180"/>
-                  <a:pt x="0" y="0"/>
-                </a:cubicBezTo>
-                <a:close/>
-              </a:path>
-            </a:pathLst>
-          </a:custGeom>
-          <a:solidFill>
-            <a:schemeClr val="accent2"/>
-          </a:solidFill>
-          <a:ln w="41275" cap="rnd">
-            <a:solidFill>
-              <a:schemeClr val="accent2"/>
-            </a:solidFill>
-            <a:round/>
-            <a:extLst>
-              <a:ext uri="{C807C97D-BFC1-408E-A445-0C87EB9F89A2}">
-                <ask:lineSketchStyleProps xmlns:ask="http://schemas.microsoft.com/office/drawing/2018/sketchyshapes" sd="2727557108">
-                  <a:prstGeom prst="rect">
-                    <a:avLst/>
-                  </a:prstGeom>
-                  <ask:type>
-                    <ask:lineSketchFreehand/>
-                  </ask:type>
-                </ask:lineSketchStyleProps>
-              </a:ext>
-            </a:extLst>
-          </a:ln>
-        </p:spPr>
-        <p:style>
-          <a:lnRef idx="2">
-            <a:schemeClr val="accent1">
-              <a:shade val="50000"/>
-            </a:schemeClr>
-          </a:lnRef>
-          <a:fillRef idx="1">
-            <a:schemeClr val="accent1"/>
-          </a:fillRef>
-          <a:effectRef idx="0">
-            <a:schemeClr val="accent1"/>
-          </a:effectRef>
-          <a:fontRef idx="minor">
-            <a:schemeClr val="lt1"/>
-          </a:fontRef>
-        </p:style>
-        <p:txBody>
-          <a:bodyPr rtlCol="0" anchor="ctr"/>
-          <a:lstStyle/>
-          <a:p>
-            <a:pPr algn="ctr"/>
-            <a:endParaRPr lang="en-US"/>
-          </a:p>
-        </p:txBody>
-      </p:sp>
-      <p:sp>
-        <p:nvSpPr>
-          <p:cNvPr id="6" name="Dátum helye 5">
-            <a:extLst>
-              <a:ext uri="{FF2B5EF4-FFF2-40B4-BE49-F238E27FC236}">
-                <a16:creationId xmlns:a16="http://schemas.microsoft.com/office/drawing/2014/main" id="{6484474F-5500-8FDB-CF4B-D9EE49C3C53C}"/>
-              </a:ext>
-            </a:extLst>
-          </p:cNvPr>
-          <p:cNvSpPr>
-            <a:spLocks noGrp="1"/>
-          </p:cNvSpPr>
-          <p:nvPr>
-            <p:ph type="dt" sz="half" idx="10"/>
-          </p:nvPr>
-        </p:nvSpPr>
-        <p:spPr/>
-        <p:txBody>
-          <a:bodyPr/>
-          <a:lstStyle/>
-          <a:p>
-            <a:fld id="{5C85A438-3713-F446-BD7A-55D18856C613}" type="datetime1">
-              <a:rPr lang="hu-HU" smtClean="0"/>
-              <a:t>2025. 11. 05.</a:t>
-            </a:fld>
-            <a:endParaRPr lang="hu-HU"/>
-          </a:p>
-        </p:txBody>
-      </p:sp>
-      <p:sp>
-        <p:nvSpPr>
-          <p:cNvPr id="7" name="Dia számának helye 6">
-            <a:extLst>
-              <a:ext uri="{FF2B5EF4-FFF2-40B4-BE49-F238E27FC236}">
-                <a16:creationId xmlns:a16="http://schemas.microsoft.com/office/drawing/2014/main" id="{15212F9E-E412-BF89-1EF4-37D10781E699}"/>
-              </a:ext>
-            </a:extLst>
-          </p:cNvPr>
-          <p:cNvSpPr>
-            <a:spLocks noGrp="1"/>
-          </p:cNvSpPr>
-          <p:nvPr>
-            <p:ph type="sldNum" sz="quarter" idx="12"/>
-          </p:nvPr>
-        </p:nvSpPr>
-        <p:spPr/>
-        <p:txBody>
-          <a:bodyPr/>
-          <a:lstStyle/>
-          <a:p>
-            <a:fld id="{61F88ADF-3301-4598-B089-C6A4CC92BE83}" type="slidenum">
-              <a:rPr lang="hu-HU" smtClean="0"/>
-              <a:t>2</a:t>
-            </a:fld>
-            <a:r>
-              <a:rPr lang="hu-HU" dirty="0"/>
-              <a:t>/14</a:t>
-            </a:r>
-          </a:p>
-        </p:txBody>
-      </p:sp>
-      <p:pic>
-        <p:nvPicPr>
-          <p:cNvPr id="14" name="Tartalom helye 13" descr="A képen képernyőkép, diagram, tervezés látható&#10;&#10;Automatikusan generált leírás">
-            <a:extLst>
-              <a:ext uri="{FF2B5EF4-FFF2-40B4-BE49-F238E27FC236}">
-                <a16:creationId xmlns:a16="http://schemas.microsoft.com/office/drawing/2014/main" id="{39C365F9-1952-04F6-0DD6-246F05AEF7A6}"/>
-              </a:ext>
-            </a:extLst>
-          </p:cNvPr>
-          <p:cNvPicPr>
-            <a:picLocks noGrp="1" noChangeAspect="1"/>
-          </p:cNvPicPr>
-          <p:nvPr>
-            <p:ph idx="1"/>
-          </p:nvPr>
-        </p:nvPicPr>
-        <p:blipFill>
-          <a:blip r:embed="rId2">
-            <a:extLst>
-              <a:ext uri="{28A0092B-C50C-407E-A947-70E740481C1C}">
-                <a14:useLocalDpi xmlns:a14="http://schemas.microsoft.com/office/drawing/2010/main" val="0"/>
-              </a:ext>
-            </a:extLst>
-          </a:blip>
-          <a:stretch>
-            <a:fillRect/>
-          </a:stretch>
-        </p:blipFill>
-        <p:spPr>
-          <a:xfrm>
-            <a:off x="200175" y="2297565"/>
-            <a:ext cx="11787051" cy="3428190"/>
-          </a:xfrm>
-        </p:spPr>
-      </p:pic>
-    </p:spTree>
-    <p:extLst>
-      <p:ext uri="{BB962C8B-B14F-4D97-AF65-F5344CB8AC3E}">
-        <p14:creationId xmlns:p14="http://schemas.microsoft.com/office/powerpoint/2010/main" val="2090047926"/>
       </p:ext>
     </p:extLst>
   </p:cSld>
@@ -8363,15 +9643,15 @@
           <a:p>
             <a:pPr lvl="1"/>
             <a:r>
-              <a:rPr lang="hu-HU" sz="1800" dirty="0" err="1"/>
+              <a:rPr lang="hu-HU" sz="2200" dirty="0" err="1"/>
               <a:t>Semantic</a:t>
             </a:r>
             <a:r>
-              <a:rPr lang="hu-HU" sz="1800" dirty="0"/>
+              <a:rPr lang="hu-HU" sz="2200" dirty="0"/>
               <a:t> </a:t>
             </a:r>
             <a:r>
-              <a:rPr lang="hu-HU" sz="1800" dirty="0" err="1"/>
+              <a:rPr lang="hu-HU" sz="2200" dirty="0" err="1"/>
               <a:t>Chunking</a:t>
             </a:r>
             <a:endParaRPr lang="hu-HU" sz="2200" dirty="0"/>
@@ -8401,7 +9681,7 @@
           <a:p>
             <a:fld id="{308DC56D-A89B-7A46-BB67-D506DBA2B2C4}" type="datetime1">
               <a:rPr lang="hu-HU" smtClean="0"/>
-              <a:t>2025. 11. 05.</a:t>
+              <a:t>2025. 11. 06.</a:t>
             </a:fld>
             <a:endParaRPr lang="hu-HU"/>
           </a:p>
@@ -8991,7 +10271,7 @@
           <a:p>
             <a:fld id="{4FAACB8C-8A8C-8F41-B579-E127A30BCC8D}" type="datetime1">
               <a:rPr lang="hu-HU" smtClean="0"/>
-              <a:t>2025. 11. 05.</a:t>
+              <a:t>2025. 11. 06.</a:t>
             </a:fld>
             <a:endParaRPr lang="hu-HU"/>
           </a:p>
@@ -9087,7 +10367,7 @@
           <a:p>
             <a:r>
               <a:rPr lang="hu-HU" b="1" dirty="0"/>
-              <a:t>Hasonlóság mérési technikák</a:t>
+              <a:t>Hasonlóságmérési technikák</a:t>
             </a:r>
           </a:p>
         </p:txBody>
@@ -9244,7 +10524,7 @@
           <a:p>
             <a:fld id="{4368D167-9427-CA44-9384-E35089ED55DF}" type="datetime1">
               <a:rPr lang="hu-HU" smtClean="0"/>
-              <a:t>2025. 11. 05.</a:t>
+              <a:t>2025. 11. 06.</a:t>
             </a:fld>
             <a:endParaRPr lang="hu-HU"/>
           </a:p>
@@ -9880,7 +11160,7 @@
                   <a:spcPts val="600"/>
                 </a:spcAft>
               </a:pPr>
-              <a:t>11/5/25</a:t>
+              <a:t>11/6/25</a:t>
             </a:fld>
             <a:endParaRPr lang="en-US">
               <a:solidFill>
@@ -10776,6 +12056,10 @@
               <a:rPr lang="en-US" sz="2400" dirty="0" err="1"/>
               <a:t>embeddingen</a:t>
             </a:r>
+            <a:r>
+              <a:rPr lang="en-US" sz="2400" dirty="0"/>
+              <a:t> (Brute force)</a:t>
+            </a:r>
             <a:endParaRPr lang="hu-HU" sz="2400" dirty="0"/>
           </a:p>
           <a:p>
@@ -10887,7 +12171,7 @@
             </a:pPr>
             <a:fld id="{ACB4A642-E289-D849-9780-C21666DBF77C}" type="datetime1">
               <a:rPr lang="hu-HU" smtClean="0"/>
-              <a:t>2025. 11. 05.</a:t>
+              <a:t>2025. 11. 06.</a:t>
             </a:fld>
             <a:endParaRPr lang="hu-HU"/>
           </a:p>
@@ -11638,7 +12922,7 @@
             </a:pPr>
             <a:fld id="{93B65CD1-5108-2149-AD8B-F412A6622A91}" type="datetime1">
               <a:rPr lang="hu-HU" smtClean="0"/>
-              <a:t>2025. 11. 05.</a:t>
+              <a:t>2025. 11. 06.</a:t>
             </a:fld>
             <a:endParaRPr lang="hu-HU"/>
           </a:p>
@@ -11818,7 +13102,7 @@
           <a:p>
             <a:fld id="{AB697F88-25D7-7E4E-91DA-57125152F457}" type="datetime1">
               <a:rPr lang="hu-HU" smtClean="0"/>
-              <a:t>2025. 11. 05.</a:t>
+              <a:t>2025. 11. 06.</a:t>
             </a:fld>
             <a:endParaRPr lang="hu-HU"/>
           </a:p>
@@ -11900,7 +13184,7 @@
         </p:blipFill>
         <p:spPr>
           <a:xfrm>
-            <a:off x="496390" y="1492664"/>
+            <a:off x="667295" y="1659144"/>
             <a:ext cx="10857410" cy="4684299"/>
           </a:xfrm>
           <a:prstGeom prst="rect">

</xml_diff>

<commit_message>
tdk ppt jegyzet iras
</commit_message>
<xml_diff>
--- a/tdk/tdk_v1.pptx
+++ b/tdk/tdk_v1.pptx
@@ -1148,6 +1148,48 @@
               <a:t> környezetben leromlik.</a:t>
             </a:r>
           </a:p>
+          <a:p>
+            <a:endParaRPr lang="hu-HU" dirty="0"/>
+          </a:p>
+          <a:p>
+            <a:r>
+              <a:rPr lang="hu-HU" dirty="0"/>
+              <a:t>ARI: A modell által képzett </a:t>
+            </a:r>
+            <a:r>
+              <a:rPr lang="hu-HU" dirty="0" err="1"/>
+              <a:t>klaszterezés</a:t>
+            </a:r>
+            <a:r>
+              <a:rPr lang="hu-HU" dirty="0"/>
+              <a:t> </a:t>
+            </a:r>
+            <a:r>
+              <a:rPr lang="hu-HU" b="1" dirty="0"/>
+              <a:t>mennyire egyezik meg a valódi címkékkel</a:t>
+            </a:r>
+            <a:r>
+              <a:rPr lang="hu-HU" dirty="0"/>
+              <a:t>, véletlenszerű egyezéstől korrigálva.</a:t>
+            </a:r>
+          </a:p>
+          <a:p>
+            <a:endParaRPr lang="hu-HU" dirty="0"/>
+          </a:p>
+          <a:p>
+            <a:r>
+              <a:rPr lang="hu-HU" dirty="0"/>
+              <a:t>NMI: A modell klaszterei és a valódi címkék </a:t>
+            </a:r>
+            <a:r>
+              <a:rPr lang="hu-HU" b="1" dirty="0"/>
+              <a:t>mennyi közös információt tartalmaznak</a:t>
+            </a:r>
+            <a:r>
+              <a:rPr lang="hu-HU" dirty="0"/>
+              <a:t>, azaz mennyire jól egyeznek egymással normalizált skálán (0–1 között)</a:t>
+            </a:r>
+          </a:p>
         </p:txBody>
       </p:sp>
       <p:sp>
@@ -1603,6 +1645,56 @@
             </a:r>
           </a:p>
           <a:p>
+            <a:endParaRPr lang="hu-HU" b="0" dirty="0">
+              <a:solidFill>
+                <a:srgbClr val="000000"/>
+              </a:solidFill>
+              <a:effectLst/>
+              <a:latin typeface="Times New Roman" panose="02020603050405020304" pitchFamily="18" charset="0"/>
+            </a:endParaRPr>
+          </a:p>
+          <a:p>
+            <a:r>
+              <a:rPr lang="hu-HU" b="0" dirty="0" err="1">
+                <a:solidFill>
+                  <a:srgbClr val="000000"/>
+                </a:solidFill>
+                <a:effectLst/>
+                <a:latin typeface="Times New Roman" panose="02020603050405020304" pitchFamily="18" charset="0"/>
+              </a:rPr>
+              <a:t>Recall</a:t>
+            </a:r>
+            <a:r>
+              <a:rPr lang="hu-HU" b="0" dirty="0">
+                <a:solidFill>
+                  <a:srgbClr val="000000"/>
+                </a:solidFill>
+                <a:effectLst/>
+                <a:latin typeface="Times New Roman" panose="02020603050405020304" pitchFamily="18" charset="0"/>
+              </a:rPr>
+              <a:t>=TP / (TP + FN). A </a:t>
+            </a:r>
+            <a:r>
+              <a:rPr lang="hu-HU" dirty="0"/>
+              <a:t>valódi pozitív esetek közül </a:t>
+            </a:r>
+            <a:r>
+              <a:rPr lang="hu-HU" b="1" dirty="0"/>
+              <a:t>hányat talált meg helyesen a modell</a:t>
+            </a:r>
+            <a:r>
+              <a:rPr lang="hu-HU" dirty="0"/>
+              <a:t>.</a:t>
+            </a:r>
+            <a:endParaRPr lang="hu-HU" b="0" dirty="0">
+              <a:solidFill>
+                <a:srgbClr val="000000"/>
+              </a:solidFill>
+              <a:effectLst/>
+              <a:latin typeface="Times New Roman" panose="02020603050405020304" pitchFamily="18" charset="0"/>
+            </a:endParaRPr>
+          </a:p>
+          <a:p>
             <a:endParaRPr lang="hu-HU" dirty="0"/>
           </a:p>
           <a:p>
@@ -2866,7 +2958,7 @@
             </a:r>
             <a:r>
               <a:rPr lang="hu-HU" dirty="0"/>
-              <a:t>'-ot, vagyis szemantikus darabolást alkalmaztam. Ez azért fontos, mert nem csak fix méretű darabokra vágjuk a szöveget, hanem megpróbáljuk a logikailag összetartozó 	 	részeket egyben tartani. Ez nagyban segíti a későbbi visszakeresés pontosságát.</a:t>
+              <a:t>'-ot, vagyis szemantikus darabolást alkalmaztam. Ez azért fontos, mert nem csak fix méretű darabokra vágjuk a szöveget, hanem megpróbáljuk a logikailag összetartozó részeket egyben tartani. Ez nagyban segíti a későbbi visszakeresés pontosságát.</a:t>
             </a:r>
           </a:p>
         </p:txBody>
@@ -4069,7 +4161,7 @@
           <a:bodyPr/>
           <a:lstStyle/>
           <a:p>
-            <a:fld id="{B7571CAD-6F13-184D-A3E8-750FE35B9EBC}" type="datetime1">
+            <a:fld id="{D45F21B2-F76C-DA4E-93C7-1ED776993694}" type="datetime1">
               <a:rPr lang="hu-HU" smtClean="0"/>
               <a:t>2025. 11. 08.</a:t>
             </a:fld>
@@ -4270,7 +4362,7 @@
           <a:bodyPr/>
           <a:lstStyle/>
           <a:p>
-            <a:fld id="{DA747407-E380-7C4C-956A-D6E19B9BA48E}" type="datetime1">
+            <a:fld id="{639F617D-633B-144B-B338-1A3186D94DEC}" type="datetime1">
               <a:rPr lang="hu-HU" smtClean="0"/>
               <a:t>2025. 11. 08.</a:t>
             </a:fld>
@@ -4478,7 +4570,7 @@
           <a:bodyPr/>
           <a:lstStyle/>
           <a:p>
-            <a:fld id="{DE8A1641-DB98-1945-938C-2D56ADE4DCEF}" type="datetime1">
+            <a:fld id="{EB40C74A-E794-5D4C-99F0-E0908F250C85}" type="datetime1">
               <a:rPr lang="hu-HU" smtClean="0"/>
               <a:t>2025. 11. 08.</a:t>
             </a:fld>
@@ -4676,7 +4768,7 @@
           <a:bodyPr/>
           <a:lstStyle/>
           <a:p>
-            <a:fld id="{AB697F88-25D7-7E4E-91DA-57125152F457}" type="datetime1">
+            <a:fld id="{FB2979DB-241A-8544-95D6-5A5515E861C2}" type="datetime1">
               <a:rPr lang="hu-HU" smtClean="0"/>
               <a:t>2025. 11. 08.</a:t>
             </a:fld>
@@ -4951,7 +5043,7 @@
           <a:bodyPr/>
           <a:lstStyle/>
           <a:p>
-            <a:fld id="{BB9243F7-EB01-1C49-8DF4-B5E7D3EDCB05}" type="datetime1">
+            <a:fld id="{E1238A03-143C-DC48-B6FB-03520BF3D264}" type="datetime1">
               <a:rPr lang="hu-HU" smtClean="0"/>
               <a:t>2025. 11. 08.</a:t>
             </a:fld>
@@ -5216,7 +5308,7 @@
           <a:bodyPr/>
           <a:lstStyle/>
           <a:p>
-            <a:fld id="{293A0E93-9A86-7044-A356-C546BEFBED63}" type="datetime1">
+            <a:fld id="{32D5DABD-02F3-C24D-B459-BA5A52C7C0D3}" type="datetime1">
               <a:rPr lang="hu-HU" smtClean="0"/>
               <a:t>2025. 11. 08.</a:t>
             </a:fld>
@@ -5628,7 +5720,7 @@
           <a:bodyPr/>
           <a:lstStyle/>
           <a:p>
-            <a:fld id="{E4744146-0A6C-8F43-AB21-D823E7CB24D4}" type="datetime1">
+            <a:fld id="{B8F665F1-11A6-C146-8C9C-4EAD2B21F502}" type="datetime1">
               <a:rPr lang="hu-HU" smtClean="0"/>
               <a:t>2025. 11. 08.</a:t>
             </a:fld>
@@ -5769,7 +5861,7 @@
           <a:bodyPr/>
           <a:lstStyle/>
           <a:p>
-            <a:fld id="{8EF3C242-AF4E-0F4E-B1A5-0050A5B92112}" type="datetime1">
+            <a:fld id="{0505F671-323E-D34A-8D4F-5155E3541BC7}" type="datetime1">
               <a:rPr lang="hu-HU" smtClean="0"/>
               <a:t>2025. 11. 08.</a:t>
             </a:fld>
@@ -5882,7 +5974,7 @@
           <a:bodyPr/>
           <a:lstStyle/>
           <a:p>
-            <a:fld id="{B6DD6928-E8BB-F645-9B89-505C65382616}" type="datetime1">
+            <a:fld id="{B3CDB417-D9D9-C740-B221-44D378005732}" type="datetime1">
               <a:rPr lang="hu-HU" smtClean="0"/>
               <a:t>2025. 11. 08.</a:t>
             </a:fld>
@@ -6193,7 +6285,7 @@
           <a:bodyPr/>
           <a:lstStyle/>
           <a:p>
-            <a:fld id="{FC32935B-306A-AF4A-83C7-5ACF2C37EC40}" type="datetime1">
+            <a:fld id="{3980F3EA-3925-E241-9F9A-1E3EF43D2F81}" type="datetime1">
               <a:rPr lang="hu-HU" smtClean="0"/>
               <a:t>2025. 11. 08.</a:t>
             </a:fld>
@@ -6481,7 +6573,7 @@
           <a:bodyPr/>
           <a:lstStyle/>
           <a:p>
-            <a:fld id="{DF03F5C2-BC5C-E946-BE19-5970FFE88346}" type="datetime1">
+            <a:fld id="{662B74F7-95E0-1C4A-BBFA-D3DEF04605D4}" type="datetime1">
               <a:rPr lang="hu-HU" smtClean="0"/>
               <a:t>2025. 11. 08.</a:t>
             </a:fld>
@@ -6722,7 +6814,7 @@
             </a:lvl1pPr>
           </a:lstStyle>
           <a:p>
-            <a:fld id="{F1EA9AB3-3E45-1F4D-91EA-19B6CDD7EF89}" type="datetime1">
+            <a:fld id="{E04DB062-3C69-2A49-980E-3FE962CDF110}" type="datetime1">
               <a:rPr lang="hu-HU" smtClean="0"/>
               <a:t>2025. 11. 08.</a:t>
             </a:fld>
@@ -7661,7 +7753,7 @@
           <a:bodyPr/>
           <a:lstStyle/>
           <a:p>
-            <a:fld id="{AB697F88-25D7-7E4E-91DA-57125152F457}" type="datetime1">
+            <a:fld id="{16CFAA20-991C-5440-821D-EF7936105166}" type="datetime1">
               <a:rPr lang="hu-HU" smtClean="0"/>
               <a:t>2025. 11. 08.</a:t>
             </a:fld>
@@ -7784,7 +7876,7 @@
           <a:bodyPr/>
           <a:lstStyle/>
           <a:p>
-            <a:fld id="{604F7F41-D779-A547-A1A3-0928E654DA43}" type="datetime1">
+            <a:fld id="{031D0D19-1B35-7A4F-93B5-1EDA6F972E33}" type="datetime1">
               <a:rPr lang="hu-HU" smtClean="0"/>
               <a:t>2025. 11. 08.</a:t>
             </a:fld>
@@ -8185,7 +8277,7 @@
           <a:bodyPr/>
           <a:lstStyle/>
           <a:p>
-            <a:fld id="{AB697F88-25D7-7E4E-91DA-57125152F457}" type="datetime1">
+            <a:fld id="{F5CF19C3-C554-0D49-858F-BC5A4F8BAF23}" type="datetime1">
               <a:rPr lang="hu-HU" smtClean="0"/>
               <a:t>2025. 11. 08.</a:t>
             </a:fld>
@@ -8301,7 +8393,7 @@
           <a:bodyPr/>
           <a:lstStyle/>
           <a:p>
-            <a:fld id="{1D89F031-1307-194F-983A-F3429BE6CD69}" type="datetime1">
+            <a:fld id="{86D7C4ED-070D-D147-BEC5-7EAE588D72B2}" type="datetime1">
               <a:rPr lang="hu-HU" smtClean="0"/>
               <a:t>2025. 11. 08.</a:t>
             </a:fld>
@@ -8531,7 +8623,7 @@
           <a:bodyPr/>
           <a:lstStyle/>
           <a:p>
-            <a:fld id="{AB697F88-25D7-7E4E-91DA-57125152F457}" type="datetime1">
+            <a:fld id="{DB103250-059E-6C49-9AEC-D7E11F74EA17}" type="datetime1">
               <a:rPr lang="hu-HU" smtClean="0"/>
               <a:t>2025. 11. 08.</a:t>
             </a:fld>
@@ -8665,7 +8757,7 @@
           <a:bodyPr/>
           <a:lstStyle/>
           <a:p>
-            <a:fld id="{23789548-D724-1F48-B49D-E29266C4BD81}" type="datetime1">
+            <a:fld id="{CA3B4C4B-4FCE-684E-BDCF-894303FF802E}" type="datetime1">
               <a:rPr lang="hu-HU" smtClean="0"/>
               <a:t>2025. 11. 08.</a:t>
             </a:fld>
@@ -8987,7 +9079,7 @@
           <a:bodyPr/>
           <a:lstStyle/>
           <a:p>
-            <a:fld id="{AB697F88-25D7-7E4E-91DA-57125152F457}" type="datetime1">
+            <a:fld id="{A1F67968-9289-324A-8185-9F1024D0E0BB}" type="datetime1">
               <a:rPr lang="hu-HU" smtClean="0"/>
               <a:t>2025. 11. 08.</a:t>
             </a:fld>
@@ -9105,7 +9197,7 @@
           <a:bodyPr/>
           <a:lstStyle/>
           <a:p>
-            <a:fld id="{AB697F88-25D7-7E4E-91DA-57125152F457}" type="datetime1">
+            <a:fld id="{C19EC71B-C64D-AC47-B57B-94F3463CBF7C}" type="datetime1">
               <a:rPr lang="hu-HU" smtClean="0"/>
               <a:t>2025. 11. 08.</a:t>
             </a:fld>
@@ -9394,7 +9486,7 @@
           <a:bodyPr/>
           <a:lstStyle/>
           <a:p>
-            <a:fld id="{AB697F88-25D7-7E4E-91DA-57125152F457}" type="datetime1">
+            <a:fld id="{9B9C5130-88B4-B04A-A570-CDDCA513217F}" type="datetime1">
               <a:rPr lang="hu-HU" smtClean="0"/>
               <a:t>2025. 11. 08.</a:t>
             </a:fld>
@@ -9658,7 +9750,7 @@
           <a:bodyPr/>
           <a:lstStyle/>
           <a:p>
-            <a:fld id="{AB697F88-25D7-7E4E-91DA-57125152F457}" type="datetime1">
+            <a:fld id="{C6ADFBD6-396A-C74B-847F-F81995866E7F}" type="datetime1">
               <a:rPr lang="hu-HU" smtClean="0"/>
               <a:t>2025. 11. 08.</a:t>
             </a:fld>
@@ -10311,7 +10403,7 @@
           <a:bodyPr/>
           <a:lstStyle/>
           <a:p>
-            <a:fld id="{5C85A438-3713-F446-BD7A-55D18856C613}" type="datetime1">
+            <a:fld id="{D3B9E4F3-2471-F946-A10E-F965F7F15FF3}" type="datetime1">
               <a:rPr lang="hu-HU" smtClean="0"/>
               <a:t>2025. 11. 08.</a:t>
             </a:fld>
@@ -11293,13 +11385,8 @@
                 <a:spcPts val="600"/>
               </a:spcAft>
             </a:pPr>
-            <a:fld id="{AB697F88-25D7-7E4E-91DA-57125152F457}" type="datetime1">
+            <a:fld id="{29D8A9DB-A63D-1E43-964A-FEA6F241DBC6}" type="datetime1">
               <a:rPr lang="hu-HU" smtClean="0"/>
-              <a:pPr>
-                <a:spcAft>
-                  <a:spcPts val="600"/>
-                </a:spcAft>
-              </a:pPr>
               <a:t>2025. 11. 08.</a:t>
             </a:fld>
             <a:endParaRPr lang="hu-HU"/>
@@ -13403,7 +13490,7 @@
           <a:bodyPr/>
           <a:lstStyle/>
           <a:p>
-            <a:fld id="{308DC56D-A89B-7A46-BB67-D506DBA2B2C4}" type="datetime1">
+            <a:fld id="{9A3D4093-34E7-DB4F-8E21-29319E040103}" type="datetime1">
               <a:rPr lang="hu-HU" smtClean="0"/>
               <a:t>2025. 11. 08.</a:t>
             </a:fld>
@@ -13982,7 +14069,7 @@
           <a:bodyPr/>
           <a:lstStyle/>
           <a:p>
-            <a:fld id="{4FAACB8C-8A8C-8F41-B579-E127A30BCC8D}" type="datetime1">
+            <a:fld id="{EDCD7766-E8FF-F045-B46B-9108152DAA94}" type="datetime1">
               <a:rPr lang="hu-HU" smtClean="0"/>
               <a:t>2025. 11. 08.</a:t>
             </a:fld>
@@ -14235,7 +14322,7 @@
           <a:bodyPr/>
           <a:lstStyle/>
           <a:p>
-            <a:fld id="{4368D167-9427-CA44-9384-E35089ED55DF}" type="datetime1">
+            <a:fld id="{77E87468-36DB-7F46-920C-0F19CC9A9134}" type="datetime1">
               <a:rPr lang="hu-HU" smtClean="0"/>
               <a:t>2025. 11. 08.</a:t>
             </a:fld>
@@ -15215,7 +15302,7 @@
                 <a:spcPts val="600"/>
               </a:spcAft>
             </a:pPr>
-            <a:fld id="{ACB4A642-E289-D849-9780-C21666DBF77C}" type="datetime1">
+            <a:fld id="{D24C2032-E76D-2848-BAF7-0E597B598D68}" type="datetime1">
               <a:rPr lang="hu-HU" smtClean="0"/>
               <a:t>2025. 11. 08.</a:t>
             </a:fld>
@@ -15816,7 +15903,7 @@
         </p:blipFill>
         <p:spPr>
           <a:xfrm>
-            <a:off x="120940" y="2218074"/>
+            <a:off x="120940" y="2236003"/>
             <a:ext cx="11945522" cy="4001751"/>
           </a:xfrm>
           <a:prstGeom prst="rect">
@@ -15857,22 +15944,17 @@
                 <a:spcPts val="600"/>
               </a:spcAft>
             </a:pPr>
-            <a:fld id="{C410DB5E-A372-294A-ADC7-737DED99DBCB}" type="datetime1">
-              <a:rPr lang="en-US" smtClean="0">
+            <a:fld id="{032D23C5-3E05-FB40-811A-7852437E3550}" type="datetime1">
+              <a:rPr lang="hu-HU" smtClean="0">
                 <a:solidFill>
                   <a:schemeClr val="tx1">
                     <a:tint val="75000"/>
                   </a:schemeClr>
                 </a:solidFill>
               </a:rPr>
-              <a:pPr>
-                <a:spcAft>
-                  <a:spcPts val="600"/>
-                </a:spcAft>
-              </a:pPr>
-              <a:t>11/8/25</a:t>
+              <a:t>2025. 11. 08.</a:t>
             </a:fld>
-            <a:endParaRPr lang="en-US">
+            <a:endParaRPr lang="en-US" dirty="0">
               <a:solidFill>
                 <a:schemeClr val="tx1">
                   <a:tint val="75000"/>
@@ -16596,7 +16678,7 @@
                 <a:spcPts val="600"/>
               </a:spcAft>
             </a:pPr>
-            <a:fld id="{93B65CD1-5108-2149-AD8B-F412A6622A91}" type="datetime1">
+            <a:fld id="{05B90B19-A1FC-5745-9E3E-9A58B2658B29}" type="datetime1">
               <a:rPr lang="hu-HU" smtClean="0"/>
               <a:t>2025. 11. 08.</a:t>
             </a:fld>
@@ -16783,7 +16865,7 @@
           <a:bodyPr/>
           <a:lstStyle/>
           <a:p>
-            <a:fld id="{AB697F88-25D7-7E4E-91DA-57125152F457}" type="datetime1">
+            <a:fld id="{78DF9215-F87C-794D-9DB3-DA814D7D6B51}" type="datetime1">
               <a:rPr lang="hu-HU" smtClean="0"/>
               <a:t>2025. 11. 08.</a:t>
             </a:fld>

</xml_diff>